<commit_message>
Update Towards a general data model of waste flows_2.pptx
</commit_message>
<xml_diff>
--- a/Presentations/Towards a general data model of waste flows_2.pptx
+++ b/Presentations/Towards a general data model of waste flows_2.pptx
@@ -5,10 +5,10 @@
     <p:sldMasterId id="2147483660" r:id="rId1"/>
   </p:sldMasterIdLst>
   <p:notesMasterIdLst>
-    <p:notesMasterId r:id="rId20"/>
+    <p:notesMasterId r:id="rId21"/>
   </p:notesMasterIdLst>
   <p:handoutMasterIdLst>
-    <p:handoutMasterId r:id="rId21"/>
+    <p:handoutMasterId r:id="rId22"/>
   </p:handoutMasterIdLst>
   <p:sldIdLst>
     <p:sldId id="257" r:id="rId2"/>
@@ -17,18 +17,19 @@
     <p:sldId id="908" r:id="rId5"/>
     <p:sldId id="910" r:id="rId6"/>
     <p:sldId id="909" r:id="rId7"/>
-    <p:sldId id="911" r:id="rId8"/>
-    <p:sldId id="905" r:id="rId9"/>
-    <p:sldId id="906" r:id="rId10"/>
-    <p:sldId id="902" r:id="rId11"/>
-    <p:sldId id="901" r:id="rId12"/>
-    <p:sldId id="892" r:id="rId13"/>
-    <p:sldId id="895" r:id="rId14"/>
-    <p:sldId id="898" r:id="rId15"/>
-    <p:sldId id="896" r:id="rId16"/>
-    <p:sldId id="897" r:id="rId17"/>
-    <p:sldId id="900" r:id="rId18"/>
-    <p:sldId id="755" r:id="rId19"/>
+    <p:sldId id="912" r:id="rId8"/>
+    <p:sldId id="913" r:id="rId9"/>
+    <p:sldId id="905" r:id="rId10"/>
+    <p:sldId id="906" r:id="rId11"/>
+    <p:sldId id="902" r:id="rId12"/>
+    <p:sldId id="901" r:id="rId13"/>
+    <p:sldId id="892" r:id="rId14"/>
+    <p:sldId id="895" r:id="rId15"/>
+    <p:sldId id="898" r:id="rId16"/>
+    <p:sldId id="896" r:id="rId17"/>
+    <p:sldId id="897" r:id="rId18"/>
+    <p:sldId id="900" r:id="rId19"/>
+    <p:sldId id="755" r:id="rId20"/>
   </p:sldIdLst>
   <p:sldSz cx="9144000" cy="5143500" type="screen16x9"/>
   <p:notesSz cx="6858000" cy="9144000"/>
@@ -1086,7 +1087,7 @@
           <a:p>
             <a:fld id="{A1B4DABE-419F-EC44-A8E4-36B2ABCB2323}" type="slidenum">
               <a:rPr lang="en-GB" smtClean="0"/>
-              <a:t>16</a:t>
+              <a:t>17</a:t>
             </a:fld>
             <a:endParaRPr lang="en-GB"/>
           </a:p>
@@ -1414,7 +1415,7 @@
           <a:p>
             <a:fld id="{A1B4DABE-419F-EC44-A8E4-36B2ABCB2323}" type="slidenum">
               <a:rPr lang="en-GB" smtClean="0"/>
-              <a:t>17</a:t>
+              <a:t>18</a:t>
             </a:fld>
             <a:endParaRPr lang="en-GB"/>
           </a:p>
@@ -1498,7 +1499,7 @@
           <a:p>
             <a:fld id="{A1B4DABE-419F-EC44-A8E4-36B2ABCB2323}" type="slidenum">
               <a:rPr lang="en-GB" smtClean="0"/>
-              <a:t>18</a:t>
+              <a:t>19</a:t>
             </a:fld>
             <a:endParaRPr lang="en-GB"/>
           </a:p>
@@ -2238,7 +2239,7 @@
           <a:p>
             <a:fld id="{A1B4DABE-419F-EC44-A8E4-36B2ABCB2323}" type="slidenum">
               <a:rPr lang="en-GB" smtClean="0"/>
-              <a:t>9</a:t>
+              <a:t>10</a:t>
             </a:fld>
             <a:endParaRPr lang="en-GB"/>
           </a:p>
@@ -2566,7 +2567,7 @@
           <a:p>
             <a:fld id="{A1B4DABE-419F-EC44-A8E4-36B2ABCB2323}" type="slidenum">
               <a:rPr lang="en-GB" smtClean="0"/>
-              <a:t>11</a:t>
+              <a:t>12</a:t>
             </a:fld>
             <a:endParaRPr lang="en-GB"/>
           </a:p>
@@ -2894,7 +2895,7 @@
           <a:p>
             <a:fld id="{A1B4DABE-419F-EC44-A8E4-36B2ABCB2323}" type="slidenum">
               <a:rPr lang="en-GB" smtClean="0"/>
-              <a:t>12</a:t>
+              <a:t>13</a:t>
             </a:fld>
             <a:endParaRPr lang="en-GB"/>
           </a:p>
@@ -3222,7 +3223,7 @@
           <a:p>
             <a:fld id="{A1B4DABE-419F-EC44-A8E4-36B2ABCB2323}" type="slidenum">
               <a:rPr lang="en-GB" smtClean="0"/>
-              <a:t>13</a:t>
+              <a:t>14</a:t>
             </a:fld>
             <a:endParaRPr lang="en-GB"/>
           </a:p>
@@ -3550,7 +3551,7 @@
           <a:p>
             <a:fld id="{A1B4DABE-419F-EC44-A8E4-36B2ABCB2323}" type="slidenum">
               <a:rPr lang="en-GB" smtClean="0"/>
-              <a:t>14</a:t>
+              <a:t>15</a:t>
             </a:fld>
             <a:endParaRPr lang="en-GB"/>
           </a:p>
@@ -3878,7 +3879,7 @@
           <a:p>
             <a:fld id="{A1B4DABE-419F-EC44-A8E4-36B2ABCB2323}" type="slidenum">
               <a:rPr lang="en-GB" smtClean="0"/>
-              <a:t>15</a:t>
+              <a:t>16</a:t>
             </a:fld>
             <a:endParaRPr lang="en-GB"/>
           </a:p>
@@ -10614,15 +10615,15 @@
           <p:cNvPr id="2" name="Title 1">
             <a:extLst>
               <a:ext uri="{FF2B5EF4-FFF2-40B4-BE49-F238E27FC236}">
-                <a16:creationId xmlns:a16="http://schemas.microsoft.com/office/drawing/2014/main" id="{1542FE77-7851-445E-9421-5F4A84ACA484}"/>
-              </a:ext>
-            </a:extLst>
-          </p:cNvPr>
-          <p:cNvSpPr>
-            <a:spLocks noGrp="1"/>
-          </p:cNvSpPr>
-          <p:nvPr>
-            <p:ph type="title"/>
+                <a16:creationId xmlns:a16="http://schemas.microsoft.com/office/drawing/2014/main" id="{6756827A-72C6-7644-81CF-2914EC4E579C}"/>
+              </a:ext>
+            </a:extLst>
+          </p:cNvPr>
+          <p:cNvSpPr>
+            <a:spLocks noGrp="1"/>
+          </p:cNvSpPr>
+          <p:nvPr>
+            <p:ph type="ctrTitle"/>
           </p:nvPr>
         </p:nvSpPr>
         <p:spPr/>
@@ -10632,57 +10633,26 @@
           <a:p>
             <a:r>
               <a:rPr lang="en-US" dirty="0"/>
-              <a:t>Time plan</a:t>
-            </a:r>
-          </a:p>
-        </p:txBody>
-      </p:sp>
-      <p:pic>
-        <p:nvPicPr>
-          <p:cNvPr id="5" name="Content Placeholder 4">
-            <a:extLst>
-              <a:ext uri="{FF2B5EF4-FFF2-40B4-BE49-F238E27FC236}">
-                <a16:creationId xmlns:a16="http://schemas.microsoft.com/office/drawing/2014/main" id="{C99BDAF4-4400-408E-BDB3-EA283771E9D9}"/>
-              </a:ext>
-            </a:extLst>
-          </p:cNvPr>
-          <p:cNvPicPr>
-            <a:picLocks noGrp="1" noChangeAspect="1"/>
-          </p:cNvPicPr>
-          <p:nvPr>
-            <p:ph idx="1"/>
-          </p:nvPr>
-        </p:nvPicPr>
-        <p:blipFill>
-          <a:blip r:embed="rId2"/>
-          <a:stretch>
-            <a:fillRect/>
-          </a:stretch>
-        </p:blipFill>
-        <p:spPr>
-          <a:xfrm>
-            <a:off x="1104754" y="1814513"/>
-            <a:ext cx="6823367" cy="2859087"/>
-          </a:xfrm>
-          <a:prstGeom prst="rect">
-            <a:avLst/>
-          </a:prstGeom>
-        </p:spPr>
-      </p:pic>
-      <p:sp>
-        <p:nvSpPr>
-          <p:cNvPr id="4" name="Slide Number Placeholder 3">
-            <a:extLst>
-              <a:ext uri="{FF2B5EF4-FFF2-40B4-BE49-F238E27FC236}">
-                <a16:creationId xmlns:a16="http://schemas.microsoft.com/office/drawing/2014/main" id="{9A141564-47F9-4C7D-992F-7612EDC6414C}"/>
-              </a:ext>
-            </a:extLst>
-          </p:cNvPr>
-          <p:cNvSpPr>
-            <a:spLocks noGrp="1"/>
-          </p:cNvSpPr>
-          <p:nvPr>
-            <p:ph type="sldNum" sz="quarter" idx="12"/>
+              <a:t>October 15th</a:t>
+            </a:r>
+            <a:endParaRPr lang="en-SE" dirty="0"/>
+          </a:p>
+        </p:txBody>
+      </p:sp>
+      <p:sp>
+        <p:nvSpPr>
+          <p:cNvPr id="3" name="Subtitle 2">
+            <a:extLst>
+              <a:ext uri="{FF2B5EF4-FFF2-40B4-BE49-F238E27FC236}">
+                <a16:creationId xmlns:a16="http://schemas.microsoft.com/office/drawing/2014/main" id="{10C662F5-4055-8646-ADED-6DDE72390DA5}"/>
+              </a:ext>
+            </a:extLst>
+          </p:cNvPr>
+          <p:cNvSpPr>
+            <a:spLocks noGrp="1"/>
+          </p:cNvSpPr>
+          <p:nvPr>
+            <p:ph type="subTitle" idx="1"/>
           </p:nvPr>
         </p:nvSpPr>
         <p:spPr/>
@@ -10690,19 +10660,32 @@
           <a:bodyPr/>
           <a:lstStyle/>
           <a:p>
-            <a:fld id="{988E7F75-8447-2546-BC2C-A9D2B7675F08}" type="slidenum">
-              <a:rPr lang="en-GB" smtClean="0"/>
-              <a:pPr/>
-              <a:t>10</a:t>
-            </a:fld>
-            <a:endParaRPr lang="en-GB"/>
+            <a:r>
+              <a:rPr lang="en-US" dirty="0"/>
+              <a:t>Jonathan Cohen, PhD student</a:t>
+            </a:r>
+          </a:p>
+          <a:p>
+            <a:r>
+              <a:rPr lang="en-US" dirty="0"/>
+              <a:t>Jorge Gil, Supervisor</a:t>
+            </a:r>
+          </a:p>
+          <a:p>
+            <a:r>
+              <a:rPr lang="en-US" dirty="0"/>
+              <a:t>Lars Marcus, Supervisor</a:t>
+            </a:r>
+          </a:p>
+          <a:p>
+            <a:endParaRPr lang="en-SE" dirty="0"/>
           </a:p>
         </p:txBody>
       </p:sp>
     </p:spTree>
     <p:extLst>
       <p:ext uri="{BB962C8B-B14F-4D97-AF65-F5344CB8AC3E}">
-        <p14:creationId xmlns:p14="http://schemas.microsoft.com/office/powerpoint/2010/main" val="2042966293"/>
+        <p14:creationId xmlns:p14="http://schemas.microsoft.com/office/powerpoint/2010/main" val="1340043885"/>
       </p:ext>
     </p:extLst>
   </p:cSld>
@@ -10731,10 +10714,10 @@
       </p:grpSpPr>
       <p:sp>
         <p:nvSpPr>
-          <p:cNvPr id="6" name="Title 5">
-            <a:extLst>
-              <a:ext uri="{FF2B5EF4-FFF2-40B4-BE49-F238E27FC236}">
-                <a16:creationId xmlns:a16="http://schemas.microsoft.com/office/drawing/2014/main" id="{0CF42AA4-2B62-A749-AA91-1089FE0EF731}"/>
+          <p:cNvPr id="2" name="Title 1">
+            <a:extLst>
+              <a:ext uri="{FF2B5EF4-FFF2-40B4-BE49-F238E27FC236}">
+                <a16:creationId xmlns:a16="http://schemas.microsoft.com/office/drawing/2014/main" id="{1542FE77-7851-445E-9421-5F4A84ACA484}"/>
               </a:ext>
             </a:extLst>
           </p:cNvPr>
@@ -10745,30 +10728,56 @@
             <p:ph type="title"/>
           </p:nvPr>
         </p:nvSpPr>
+        <p:spPr/>
+        <p:txBody>
+          <a:bodyPr/>
+          <a:lstStyle/>
+          <a:p>
+            <a:r>
+              <a:rPr lang="en-US" dirty="0"/>
+              <a:t>Time plan</a:t>
+            </a:r>
+          </a:p>
+        </p:txBody>
+      </p:sp>
+      <p:pic>
+        <p:nvPicPr>
+          <p:cNvPr id="5" name="Content Placeholder 4">
+            <a:extLst>
+              <a:ext uri="{FF2B5EF4-FFF2-40B4-BE49-F238E27FC236}">
+                <a16:creationId xmlns:a16="http://schemas.microsoft.com/office/drawing/2014/main" id="{C99BDAF4-4400-408E-BDB3-EA283771E9D9}"/>
+              </a:ext>
+            </a:extLst>
+          </p:cNvPr>
+          <p:cNvPicPr>
+            <a:picLocks noGrp="1" noChangeAspect="1"/>
+          </p:cNvPicPr>
+          <p:nvPr>
+            <p:ph idx="1"/>
+          </p:nvPr>
+        </p:nvPicPr>
+        <p:blipFill>
+          <a:blip r:embed="rId2"/>
+          <a:stretch>
+            <a:fillRect/>
+          </a:stretch>
+        </p:blipFill>
         <p:spPr>
           <a:xfrm>
-            <a:off x="307686" y="346538"/>
-            <a:ext cx="7038231" cy="587424"/>
-          </a:xfrm>
-        </p:spPr>
-        <p:txBody>
-          <a:bodyPr anchor="t"/>
-          <a:lstStyle/>
-          <a:p>
-            <a:r>
-              <a:rPr lang="en-US" dirty="0"/>
-              <a:t>Motivation and vision</a:t>
-            </a:r>
-            <a:endParaRPr lang="en-SE" dirty="0"/>
-          </a:p>
-        </p:txBody>
-      </p:sp>
+            <a:off x="1104754" y="1814513"/>
+            <a:ext cx="6823367" cy="2859087"/>
+          </a:xfrm>
+          <a:prstGeom prst="rect">
+            <a:avLst/>
+          </a:prstGeom>
+        </p:spPr>
+      </p:pic>
       <p:sp>
         <p:nvSpPr>
           <p:cNvPr id="4" name="Slide Number Placeholder 3">
             <a:extLst>
               <a:ext uri="{FF2B5EF4-FFF2-40B4-BE49-F238E27FC236}">
-                <a16:creationId xmlns:a16="http://schemas.microsoft.com/office/drawing/2014/main" id="{9680D3BE-20F5-244F-9E06-27645F244A36}"/>
+                <a16:creationId xmlns:a16="http://schemas.microsoft.com/office/drawing/2014/main" id="{9A141564-47F9-4C7D-992F-7612EDC6414C}"/>
               </a:ext>
             </a:extLst>
           </p:cNvPr>
@@ -10793,169 +10802,10 @@
           </a:p>
         </p:txBody>
       </p:sp>
-      <p:pic>
-        <p:nvPicPr>
-          <p:cNvPr id="5" name="Picture 4" descr="A picture containing diagram&#10;&#10;Description automatically generated">
-            <a:extLst>
-              <a:ext uri="{FF2B5EF4-FFF2-40B4-BE49-F238E27FC236}">
-                <a16:creationId xmlns:a16="http://schemas.microsoft.com/office/drawing/2014/main" id="{5AD7648E-BFB5-49BB-A2EB-319DBFD2021E}"/>
-              </a:ext>
-            </a:extLst>
-          </p:cNvPr>
-          <p:cNvPicPr>
-            <a:picLocks noChangeAspect="1"/>
-          </p:cNvPicPr>
-          <p:nvPr/>
-        </p:nvPicPr>
-        <p:blipFill>
-          <a:blip r:embed="rId3"/>
-          <a:stretch>
-            <a:fillRect/>
-          </a:stretch>
-        </p:blipFill>
-        <p:spPr>
-          <a:xfrm>
-            <a:off x="4787991" y="923201"/>
-            <a:ext cx="3102679" cy="3863000"/>
-          </a:xfrm>
-          <a:prstGeom prst="rect">
-            <a:avLst/>
-          </a:prstGeom>
-        </p:spPr>
-      </p:pic>
-      <p:pic>
-        <p:nvPicPr>
-          <p:cNvPr id="10" name="Picture 9">
-            <a:extLst>
-              <a:ext uri="{FF2B5EF4-FFF2-40B4-BE49-F238E27FC236}">
-                <a16:creationId xmlns:a16="http://schemas.microsoft.com/office/drawing/2014/main" id="{1DCA2888-A593-4FF9-9E4E-14F8FB11A77E}"/>
-              </a:ext>
-            </a:extLst>
-          </p:cNvPr>
-          <p:cNvPicPr>
-            <a:picLocks noChangeAspect="1"/>
-          </p:cNvPicPr>
-          <p:nvPr/>
-        </p:nvPicPr>
-        <p:blipFill>
-          <a:blip r:embed="rId4"/>
-          <a:stretch>
-            <a:fillRect/>
-          </a:stretch>
-        </p:blipFill>
-        <p:spPr>
-          <a:xfrm>
-            <a:off x="316266" y="1019013"/>
-            <a:ext cx="3510535" cy="3105473"/>
-          </a:xfrm>
-          <a:prstGeom prst="rect">
-            <a:avLst/>
-          </a:prstGeom>
-        </p:spPr>
-      </p:pic>
-      <p:sp>
-        <p:nvSpPr>
-          <p:cNvPr id="11" name="Oval 10">
-            <a:extLst>
-              <a:ext uri="{FF2B5EF4-FFF2-40B4-BE49-F238E27FC236}">
-                <a16:creationId xmlns:a16="http://schemas.microsoft.com/office/drawing/2014/main" id="{B63CE41C-AB16-422B-9108-1754FD6C40B5}"/>
-              </a:ext>
-            </a:extLst>
-          </p:cNvPr>
-          <p:cNvSpPr/>
-          <p:nvPr/>
-        </p:nvSpPr>
-        <p:spPr>
-          <a:xfrm>
-            <a:off x="2235200" y="1787226"/>
-            <a:ext cx="918705" cy="883403"/>
-          </a:xfrm>
-          <a:prstGeom prst="ellipse">
-            <a:avLst/>
-          </a:prstGeom>
-          <a:noFill/>
-          <a:ln>
-            <a:solidFill>
-              <a:srgbClr val="FF0000"/>
-            </a:solidFill>
-          </a:ln>
-        </p:spPr>
-        <p:style>
-          <a:lnRef idx="2">
-            <a:schemeClr val="accent1">
-              <a:shade val="50000"/>
-            </a:schemeClr>
-          </a:lnRef>
-          <a:fillRef idx="1">
-            <a:schemeClr val="accent1"/>
-          </a:fillRef>
-          <a:effectRef idx="0">
-            <a:schemeClr val="accent1"/>
-          </a:effectRef>
-          <a:fontRef idx="minor">
-            <a:schemeClr val="lt1"/>
-          </a:fontRef>
-        </p:style>
-        <p:txBody>
-          <a:bodyPr rtlCol="0" anchor="ctr"/>
-          <a:lstStyle/>
-          <a:p>
-            <a:pPr algn="ctr"/>
-            <a:endParaRPr lang="en-US"/>
-          </a:p>
-        </p:txBody>
-      </p:sp>
-      <p:sp>
-        <p:nvSpPr>
-          <p:cNvPr id="12" name="Arrow: Striped Right 11">
-            <a:extLst>
-              <a:ext uri="{FF2B5EF4-FFF2-40B4-BE49-F238E27FC236}">
-                <a16:creationId xmlns:a16="http://schemas.microsoft.com/office/drawing/2014/main" id="{3A3B4C74-7028-4511-8F2F-E3413AFFAF5F}"/>
-              </a:ext>
-            </a:extLst>
-          </p:cNvPr>
-          <p:cNvSpPr/>
-          <p:nvPr/>
-        </p:nvSpPr>
-        <p:spPr>
-          <a:xfrm>
-            <a:off x="3897367" y="2387676"/>
-            <a:ext cx="820057" cy="368145"/>
-          </a:xfrm>
-          <a:prstGeom prst="stripedRightArrow">
-            <a:avLst/>
-          </a:prstGeom>
-          <a:noFill/>
-        </p:spPr>
-        <p:style>
-          <a:lnRef idx="2">
-            <a:schemeClr val="accent1">
-              <a:shade val="50000"/>
-            </a:schemeClr>
-          </a:lnRef>
-          <a:fillRef idx="1">
-            <a:schemeClr val="accent1"/>
-          </a:fillRef>
-          <a:effectRef idx="0">
-            <a:schemeClr val="accent1"/>
-          </a:effectRef>
-          <a:fontRef idx="minor">
-            <a:schemeClr val="lt1"/>
-          </a:fontRef>
-        </p:style>
-        <p:txBody>
-          <a:bodyPr rtlCol="0" anchor="ctr"/>
-          <a:lstStyle/>
-          <a:p>
-            <a:pPr algn="ctr"/>
-            <a:endParaRPr lang="en-US"/>
-          </a:p>
-        </p:txBody>
-      </p:sp>
     </p:spTree>
     <p:extLst>
       <p:ext uri="{BB962C8B-B14F-4D97-AF65-F5344CB8AC3E}">
-        <p14:creationId xmlns:p14="http://schemas.microsoft.com/office/powerpoint/2010/main" val="4079889887"/>
+        <p14:creationId xmlns:p14="http://schemas.microsoft.com/office/powerpoint/2010/main" val="2042966293"/>
       </p:ext>
     </p:extLst>
   </p:cSld>
@@ -11010,121 +10860,9 @@
           <a:p>
             <a:r>
               <a:rPr lang="en-US" dirty="0"/>
-              <a:t>Conceptual model of waste flows I</a:t>
+              <a:t>Motivation and vision</a:t>
             </a:r>
             <a:endParaRPr lang="en-SE" dirty="0"/>
-          </a:p>
-        </p:txBody>
-      </p:sp>
-      <p:sp>
-        <p:nvSpPr>
-          <p:cNvPr id="7" name="Content Placeholder 6">
-            <a:extLst>
-              <a:ext uri="{FF2B5EF4-FFF2-40B4-BE49-F238E27FC236}">
-                <a16:creationId xmlns:a16="http://schemas.microsoft.com/office/drawing/2014/main" id="{00722AC7-24D3-B649-988F-03BE40F3B294}"/>
-              </a:ext>
-            </a:extLst>
-          </p:cNvPr>
-          <p:cNvSpPr>
-            <a:spLocks noGrp="1"/>
-          </p:cNvSpPr>
-          <p:nvPr>
-            <p:ph idx="1"/>
-          </p:nvPr>
-        </p:nvSpPr>
-        <p:spPr>
-          <a:xfrm>
-            <a:off x="3215440" y="1275662"/>
-            <a:ext cx="5784851" cy="3385238"/>
-          </a:xfrm>
-        </p:spPr>
-        <p:txBody>
-          <a:bodyPr/>
-          <a:lstStyle/>
-          <a:p>
-            <a:r>
-              <a:rPr lang="en-US" sz="1400" dirty="0"/>
-              <a:t>Any socio-economic activity happening within an urban/regional system need, use and interact with a set of support systems.</a:t>
-            </a:r>
-          </a:p>
-          <a:p>
-            <a:pPr lvl="1"/>
-            <a:r>
-              <a:rPr lang="en-US" sz="1200" dirty="0"/>
-              <a:t>Physical support systems such as the road and electricity network</a:t>
-            </a:r>
-          </a:p>
-          <a:p>
-            <a:pPr lvl="1"/>
-            <a:r>
-              <a:rPr lang="en-US" sz="1200" dirty="0"/>
-              <a:t>Institutional support system as the set of laws and regulations that determine how a system should behave</a:t>
-            </a:r>
-          </a:p>
-          <a:p>
-            <a:pPr lvl="1"/>
-            <a:r>
-              <a:rPr lang="en-US" sz="1200" dirty="0"/>
-              <a:t>Socio-cultural support system that determine how the citizens interact with the system</a:t>
-            </a:r>
-          </a:p>
-          <a:p>
-            <a:r>
-              <a:rPr lang="en-US" sz="1400" dirty="0"/>
-              <a:t>Resources (and secondary ones) can be</a:t>
-            </a:r>
-          </a:p>
-          <a:p>
-            <a:pPr marL="594900" lvl="1" indent="-342900">
-              <a:buFont typeface="+mj-lt"/>
-              <a:buAutoNum type="arabicPeriod"/>
-            </a:pPr>
-            <a:r>
-              <a:rPr lang="en-US" sz="1200" dirty="0"/>
-              <a:t>Created</a:t>
-            </a:r>
-          </a:p>
-          <a:p>
-            <a:pPr marL="594900" lvl="1" indent="-342900">
-              <a:buFont typeface="+mj-lt"/>
-              <a:buAutoNum type="arabicPeriod"/>
-            </a:pPr>
-            <a:r>
-              <a:rPr lang="en-US" sz="1200" dirty="0"/>
-              <a:t>Used</a:t>
-            </a:r>
-          </a:p>
-          <a:p>
-            <a:pPr marL="594900" lvl="1" indent="-342900">
-              <a:buFont typeface="+mj-lt"/>
-              <a:buAutoNum type="arabicPeriod"/>
-            </a:pPr>
-            <a:r>
-              <a:rPr lang="en-US" sz="1200" dirty="0"/>
-              <a:t>Transformed</a:t>
-            </a:r>
-          </a:p>
-          <a:p>
-            <a:pPr marL="594900" lvl="1" indent="-342900">
-              <a:buFont typeface="+mj-lt"/>
-              <a:buAutoNum type="arabicPeriod"/>
-            </a:pPr>
-            <a:r>
-              <a:rPr lang="en-US" sz="1200" dirty="0"/>
-              <a:t>Stored</a:t>
-            </a:r>
-          </a:p>
-          <a:p>
-            <a:r>
-              <a:rPr lang="en-US" sz="1400" dirty="0"/>
-              <a:t>In most of cases after one of these actions is executed the resources, goods or waste materials are moved from one place to another</a:t>
-            </a:r>
-          </a:p>
-          <a:p>
-            <a:pPr marL="0" indent="0">
-              <a:buNone/>
-            </a:pPr>
-            <a:endParaRPr lang="en-US" sz="1400" dirty="0"/>
           </a:p>
         </p:txBody>
       </p:sp>
@@ -11160,10 +10898,10 @@
       </p:sp>
       <p:pic>
         <p:nvPicPr>
-          <p:cNvPr id="3" name="Picture 2">
-            <a:extLst>
-              <a:ext uri="{FF2B5EF4-FFF2-40B4-BE49-F238E27FC236}">
-                <a16:creationId xmlns:a16="http://schemas.microsoft.com/office/drawing/2014/main" id="{BDB2D1C1-279C-4225-A182-D3CF34BEAF37}"/>
+          <p:cNvPr id="5" name="Picture 4" descr="A picture containing diagram&#10;&#10;Description automatically generated">
+            <a:extLst>
+              <a:ext uri="{FF2B5EF4-FFF2-40B4-BE49-F238E27FC236}">
+                <a16:creationId xmlns:a16="http://schemas.microsoft.com/office/drawing/2014/main" id="{5AD7648E-BFB5-49BB-A2EB-319DBFD2021E}"/>
               </a:ext>
             </a:extLst>
           </p:cNvPr>
@@ -11180,18 +10918,147 @@
         </p:blipFill>
         <p:spPr>
           <a:xfrm>
-            <a:off x="313200" y="1275662"/>
-            <a:ext cx="2722936" cy="2858877"/>
+            <a:off x="4787991" y="923201"/>
+            <a:ext cx="3102679" cy="3863000"/>
           </a:xfrm>
           <a:prstGeom prst="rect">
             <a:avLst/>
           </a:prstGeom>
         </p:spPr>
       </p:pic>
+      <p:pic>
+        <p:nvPicPr>
+          <p:cNvPr id="10" name="Picture 9">
+            <a:extLst>
+              <a:ext uri="{FF2B5EF4-FFF2-40B4-BE49-F238E27FC236}">
+                <a16:creationId xmlns:a16="http://schemas.microsoft.com/office/drawing/2014/main" id="{1DCA2888-A593-4FF9-9E4E-14F8FB11A77E}"/>
+              </a:ext>
+            </a:extLst>
+          </p:cNvPr>
+          <p:cNvPicPr>
+            <a:picLocks noChangeAspect="1"/>
+          </p:cNvPicPr>
+          <p:nvPr/>
+        </p:nvPicPr>
+        <p:blipFill>
+          <a:blip r:embed="rId4"/>
+          <a:stretch>
+            <a:fillRect/>
+          </a:stretch>
+        </p:blipFill>
+        <p:spPr>
+          <a:xfrm>
+            <a:off x="316266" y="1019013"/>
+            <a:ext cx="3510535" cy="3105473"/>
+          </a:xfrm>
+          <a:prstGeom prst="rect">
+            <a:avLst/>
+          </a:prstGeom>
+        </p:spPr>
+      </p:pic>
+      <p:sp>
+        <p:nvSpPr>
+          <p:cNvPr id="11" name="Oval 10">
+            <a:extLst>
+              <a:ext uri="{FF2B5EF4-FFF2-40B4-BE49-F238E27FC236}">
+                <a16:creationId xmlns:a16="http://schemas.microsoft.com/office/drawing/2014/main" id="{B63CE41C-AB16-422B-9108-1754FD6C40B5}"/>
+              </a:ext>
+            </a:extLst>
+          </p:cNvPr>
+          <p:cNvSpPr/>
+          <p:nvPr/>
+        </p:nvSpPr>
+        <p:spPr>
+          <a:xfrm>
+            <a:off x="2235200" y="1787226"/>
+            <a:ext cx="918705" cy="883403"/>
+          </a:xfrm>
+          <a:prstGeom prst="ellipse">
+            <a:avLst/>
+          </a:prstGeom>
+          <a:noFill/>
+          <a:ln>
+            <a:solidFill>
+              <a:srgbClr val="FF0000"/>
+            </a:solidFill>
+          </a:ln>
+        </p:spPr>
+        <p:style>
+          <a:lnRef idx="2">
+            <a:schemeClr val="accent1">
+              <a:shade val="50000"/>
+            </a:schemeClr>
+          </a:lnRef>
+          <a:fillRef idx="1">
+            <a:schemeClr val="accent1"/>
+          </a:fillRef>
+          <a:effectRef idx="0">
+            <a:schemeClr val="accent1"/>
+          </a:effectRef>
+          <a:fontRef idx="minor">
+            <a:schemeClr val="lt1"/>
+          </a:fontRef>
+        </p:style>
+        <p:txBody>
+          <a:bodyPr rtlCol="0" anchor="ctr"/>
+          <a:lstStyle/>
+          <a:p>
+            <a:pPr algn="ctr"/>
+            <a:endParaRPr lang="en-US"/>
+          </a:p>
+        </p:txBody>
+      </p:sp>
+      <p:sp>
+        <p:nvSpPr>
+          <p:cNvPr id="12" name="Arrow: Striped Right 11">
+            <a:extLst>
+              <a:ext uri="{FF2B5EF4-FFF2-40B4-BE49-F238E27FC236}">
+                <a16:creationId xmlns:a16="http://schemas.microsoft.com/office/drawing/2014/main" id="{3A3B4C74-7028-4511-8F2F-E3413AFFAF5F}"/>
+              </a:ext>
+            </a:extLst>
+          </p:cNvPr>
+          <p:cNvSpPr/>
+          <p:nvPr/>
+        </p:nvSpPr>
+        <p:spPr>
+          <a:xfrm>
+            <a:off x="3897367" y="2387676"/>
+            <a:ext cx="820057" cy="368145"/>
+          </a:xfrm>
+          <a:prstGeom prst="stripedRightArrow">
+            <a:avLst/>
+          </a:prstGeom>
+          <a:noFill/>
+        </p:spPr>
+        <p:style>
+          <a:lnRef idx="2">
+            <a:schemeClr val="accent1">
+              <a:shade val="50000"/>
+            </a:schemeClr>
+          </a:lnRef>
+          <a:fillRef idx="1">
+            <a:schemeClr val="accent1"/>
+          </a:fillRef>
+          <a:effectRef idx="0">
+            <a:schemeClr val="accent1"/>
+          </a:effectRef>
+          <a:fontRef idx="minor">
+            <a:schemeClr val="lt1"/>
+          </a:fontRef>
+        </p:style>
+        <p:txBody>
+          <a:bodyPr rtlCol="0" anchor="ctr"/>
+          <a:lstStyle/>
+          <a:p>
+            <a:pPr algn="ctr"/>
+            <a:endParaRPr lang="en-US"/>
+          </a:p>
+        </p:txBody>
+      </p:sp>
     </p:spTree>
     <p:extLst>
       <p:ext uri="{BB962C8B-B14F-4D97-AF65-F5344CB8AC3E}">
-        <p14:creationId xmlns:p14="http://schemas.microsoft.com/office/powerpoint/2010/main" val="388763142"/>
+        <p14:creationId xmlns:p14="http://schemas.microsoft.com/office/powerpoint/2010/main" val="4079889887"/>
       </p:ext>
     </p:extLst>
   </p:cSld>
@@ -11246,7 +11113,7 @@
           <a:p>
             <a:r>
               <a:rPr lang="en-US" dirty="0"/>
-              <a:t>Conceptual model of waste flows II</a:t>
+              <a:t>Conceptual model of waste flows I</a:t>
             </a:r>
             <a:endParaRPr lang="en-SE" dirty="0"/>
           </a:p>
@@ -11280,43 +11147,80 @@
           <a:p>
             <a:r>
               <a:rPr lang="en-US" sz="1400" dirty="0"/>
-              <a:t>Generation: Every time there is a process, a by-product is generated. Waste means any substance or object which the holder discards or intends or is required to discard. It has no value. It cannot purchase or sold.</a:t>
+              <a:t>Any socio-economic activity happening within an urban/regional system need, use and interact with a set of support systems.</a:t>
+            </a:r>
+          </a:p>
+          <a:p>
+            <a:pPr lvl="1"/>
+            <a:r>
+              <a:rPr lang="en-US" sz="1200" dirty="0"/>
+              <a:t>Physical support systems such as the road and electricity network</a:t>
+            </a:r>
+          </a:p>
+          <a:p>
+            <a:pPr lvl="1"/>
+            <a:r>
+              <a:rPr lang="en-US" sz="1200" dirty="0"/>
+              <a:t>Institutional support system as the set of laws and regulations that determine how a system should behave</a:t>
+            </a:r>
+          </a:p>
+          <a:p>
+            <a:pPr lvl="1"/>
+            <a:r>
+              <a:rPr lang="en-US" sz="1200" dirty="0"/>
+              <a:t>Socio-cultural support system that determine how the citizens interact with the system</a:t>
             </a:r>
           </a:p>
           <a:p>
             <a:r>
               <a:rPr lang="en-US" sz="1400" dirty="0"/>
-              <a:t>Transformation: By various means any waste or part of it can be transformed into a resource that can be re-introduced in the market for its use.</a:t>
+              <a:t>Resources (and secondary ones) can be</a:t>
+            </a:r>
+          </a:p>
+          <a:p>
+            <a:pPr marL="594900" lvl="1" indent="-342900">
+              <a:buFont typeface="+mj-lt"/>
+              <a:buAutoNum type="arabicPeriod"/>
+            </a:pPr>
+            <a:r>
+              <a:rPr lang="en-US" sz="1200" dirty="0"/>
+              <a:t>Created</a:t>
+            </a:r>
+          </a:p>
+          <a:p>
+            <a:pPr marL="594900" lvl="1" indent="-342900">
+              <a:buFont typeface="+mj-lt"/>
+              <a:buAutoNum type="arabicPeriod"/>
+            </a:pPr>
+            <a:r>
+              <a:rPr lang="en-US" sz="1200" dirty="0"/>
+              <a:t>Used</a:t>
+            </a:r>
+          </a:p>
+          <a:p>
+            <a:pPr marL="594900" lvl="1" indent="-342900">
+              <a:buFont typeface="+mj-lt"/>
+              <a:buAutoNum type="arabicPeriod"/>
+            </a:pPr>
+            <a:r>
+              <a:rPr lang="en-US" sz="1200" dirty="0"/>
+              <a:t>Transformed</a:t>
+            </a:r>
+          </a:p>
+          <a:p>
+            <a:pPr marL="594900" lvl="1" indent="-342900">
+              <a:buFont typeface="+mj-lt"/>
+              <a:buAutoNum type="arabicPeriod"/>
+            </a:pPr>
+            <a:r>
+              <a:rPr lang="en-US" sz="1200" dirty="0"/>
+              <a:t>Stored</a:t>
             </a:r>
           </a:p>
           <a:p>
             <a:r>
               <a:rPr lang="en-US" sz="1400" dirty="0"/>
-              <a:t>Storage: When ever waste materials are stored over time. </a:t>
-            </a:r>
-          </a:p>
-          <a:p>
-            <a:r>
-              <a:rPr lang="en-US" sz="1400" dirty="0"/>
-              <a:t>Usage: After upgrading a by-product, it could be used by another or the same industry.</a:t>
-            </a:r>
-          </a:p>
-          <a:p>
-            <a:r>
-              <a:rPr lang="en-US" sz="1400" dirty="0"/>
-              <a:t>Transport: Every time a waste material is moved from one container to another, there is need for transportation</a:t>
-            </a:r>
-          </a:p>
-          <a:p>
-            <a:r>
-              <a:rPr lang="en-US" sz="1400" dirty="0"/>
-              <a:t>Containers: Is the physical object or place that contains the waste</a:t>
-            </a:r>
-          </a:p>
-          <a:p>
-            <a:r>
-              <a:rPr lang="en-US" sz="1400" dirty="0"/>
-              <a:t>Support systems: Are the geographical and socio-economic systems that allow and determine activities in the territory</a:t>
+              <a:t>In most of cases after one of these actions is executed the resources, goods or waste materials are moved from one place to another</a:t>
             </a:r>
           </a:p>
           <a:p>
@@ -11353,16 +11257,16 @@
               <a:pPr/>
               <a:t>13</a:t>
             </a:fld>
-            <a:endParaRPr lang="en-GB" dirty="0"/>
+            <a:endParaRPr lang="en-GB"/>
           </a:p>
         </p:txBody>
       </p:sp>
       <p:pic>
         <p:nvPicPr>
-          <p:cNvPr id="2" name="Picture 1">
-            <a:extLst>
-              <a:ext uri="{FF2B5EF4-FFF2-40B4-BE49-F238E27FC236}">
-                <a16:creationId xmlns:a16="http://schemas.microsoft.com/office/drawing/2014/main" id="{80EBB802-B303-4950-957C-20C66D5056F3}"/>
+          <p:cNvPr id="3" name="Picture 2">
+            <a:extLst>
+              <a:ext uri="{FF2B5EF4-FFF2-40B4-BE49-F238E27FC236}">
+                <a16:creationId xmlns:a16="http://schemas.microsoft.com/office/drawing/2014/main" id="{BDB2D1C1-279C-4225-A182-D3CF34BEAF37}"/>
               </a:ext>
             </a:extLst>
           </p:cNvPr>
@@ -11379,8 +11283,8 @@
         </p:blipFill>
         <p:spPr>
           <a:xfrm>
-            <a:off x="205200" y="1275662"/>
-            <a:ext cx="2961220" cy="2793044"/>
+            <a:off x="313200" y="1275662"/>
+            <a:ext cx="2722936" cy="2858877"/>
           </a:xfrm>
           <a:prstGeom prst="rect">
             <a:avLst/>
@@ -11390,7 +11294,7 @@
     </p:spTree>
     <p:extLst>
       <p:ext uri="{BB962C8B-B14F-4D97-AF65-F5344CB8AC3E}">
-        <p14:creationId xmlns:p14="http://schemas.microsoft.com/office/powerpoint/2010/main" val="78915617"/>
+        <p14:creationId xmlns:p14="http://schemas.microsoft.com/office/powerpoint/2010/main" val="388763142"/>
       </p:ext>
     </p:extLst>
   </p:cSld>
@@ -11445,9 +11349,84 @@
           <a:p>
             <a:r>
               <a:rPr lang="en-US" dirty="0"/>
-              <a:t>Instances of the model - A</a:t>
+              <a:t>Conceptual model of waste flows II</a:t>
             </a:r>
             <a:endParaRPr lang="en-SE" dirty="0"/>
+          </a:p>
+        </p:txBody>
+      </p:sp>
+      <p:sp>
+        <p:nvSpPr>
+          <p:cNvPr id="7" name="Content Placeholder 6">
+            <a:extLst>
+              <a:ext uri="{FF2B5EF4-FFF2-40B4-BE49-F238E27FC236}">
+                <a16:creationId xmlns:a16="http://schemas.microsoft.com/office/drawing/2014/main" id="{00722AC7-24D3-B649-988F-03BE40F3B294}"/>
+              </a:ext>
+            </a:extLst>
+          </p:cNvPr>
+          <p:cNvSpPr>
+            <a:spLocks noGrp="1"/>
+          </p:cNvSpPr>
+          <p:nvPr>
+            <p:ph idx="1"/>
+          </p:nvPr>
+        </p:nvSpPr>
+        <p:spPr>
+          <a:xfrm>
+            <a:off x="3215440" y="1275662"/>
+            <a:ext cx="5784851" cy="3385238"/>
+          </a:xfrm>
+        </p:spPr>
+        <p:txBody>
+          <a:bodyPr/>
+          <a:lstStyle/>
+          <a:p>
+            <a:r>
+              <a:rPr lang="en-US" sz="1400" dirty="0"/>
+              <a:t>Generation: Every time there is a process, a by-product is generated. Waste means any substance or object which the holder discards or intends or is required to discard. It has no value. It cannot purchase or sold.</a:t>
+            </a:r>
+          </a:p>
+          <a:p>
+            <a:r>
+              <a:rPr lang="en-US" sz="1400" dirty="0"/>
+              <a:t>Transformation: By various means any waste or part of it can be transformed into a resource that can be re-introduced in the market for its use.</a:t>
+            </a:r>
+          </a:p>
+          <a:p>
+            <a:r>
+              <a:rPr lang="en-US" sz="1400" dirty="0"/>
+              <a:t>Storage: When ever waste materials are stored over time. </a:t>
+            </a:r>
+          </a:p>
+          <a:p>
+            <a:r>
+              <a:rPr lang="en-US" sz="1400" dirty="0"/>
+              <a:t>Usage: After upgrading a by-product, it could be used by another or the same industry.</a:t>
+            </a:r>
+          </a:p>
+          <a:p>
+            <a:r>
+              <a:rPr lang="en-US" sz="1400" dirty="0"/>
+              <a:t>Transport: Every time a waste material is moved from one container to another, there is need for transportation</a:t>
+            </a:r>
+          </a:p>
+          <a:p>
+            <a:r>
+              <a:rPr lang="en-US" sz="1400" dirty="0"/>
+              <a:t>Containers: Is the physical object or place that contains the waste</a:t>
+            </a:r>
+          </a:p>
+          <a:p>
+            <a:r>
+              <a:rPr lang="en-US" sz="1400" dirty="0"/>
+              <a:t>Support systems: Are the geographical and socio-economic systems that allow and determine activities in the territory</a:t>
+            </a:r>
+          </a:p>
+          <a:p>
+            <a:pPr marL="0" indent="0">
+              <a:buNone/>
+            </a:pPr>
+            <a:endParaRPr lang="en-US" sz="1400" dirty="0"/>
           </a:p>
         </p:txBody>
       </p:sp>
@@ -11483,19 +11462,17 @@
       </p:sp>
       <p:pic>
         <p:nvPicPr>
-          <p:cNvPr id="3" name="Content Placeholder 2" descr="A close up of a sign&#10;&#10;Description automatically generated">
-            <a:extLst>
-              <a:ext uri="{FF2B5EF4-FFF2-40B4-BE49-F238E27FC236}">
-                <a16:creationId xmlns:a16="http://schemas.microsoft.com/office/drawing/2014/main" id="{B496A107-C7E6-4E6B-AB64-60C6DBF4F432}"/>
+          <p:cNvPr id="2" name="Picture 1">
+            <a:extLst>
+              <a:ext uri="{FF2B5EF4-FFF2-40B4-BE49-F238E27FC236}">
+                <a16:creationId xmlns:a16="http://schemas.microsoft.com/office/drawing/2014/main" id="{80EBB802-B303-4950-957C-20C66D5056F3}"/>
               </a:ext>
             </a:extLst>
           </p:cNvPr>
           <p:cNvPicPr>
-            <a:picLocks noGrp="1" noChangeAspect="1"/>
+            <a:picLocks noChangeAspect="1"/>
           </p:cNvPicPr>
-          <p:nvPr>
-            <p:ph idx="1"/>
-          </p:nvPr>
+          <p:nvPr/>
         </p:nvPicPr>
         <p:blipFill>
           <a:blip r:embed="rId3"/>
@@ -11505,464 +11482,18 @@
         </p:blipFill>
         <p:spPr>
           <a:xfrm>
-            <a:off x="725923" y="1108133"/>
-            <a:ext cx="6242371" cy="1009702"/>
-          </a:xfrm>
-        </p:spPr>
-      </p:pic>
-      <p:sp>
-        <p:nvSpPr>
-          <p:cNvPr id="8" name="Flowchart: Multidocument 7">
-            <a:extLst>
-              <a:ext uri="{FF2B5EF4-FFF2-40B4-BE49-F238E27FC236}">
-                <a16:creationId xmlns:a16="http://schemas.microsoft.com/office/drawing/2014/main" id="{E6A63554-8453-4CC4-97DB-90BEB8C02CBD}"/>
-              </a:ext>
-            </a:extLst>
-          </p:cNvPr>
-          <p:cNvSpPr/>
-          <p:nvPr/>
-        </p:nvSpPr>
-        <p:spPr>
-          <a:xfrm>
-            <a:off x="887023" y="2450169"/>
-            <a:ext cx="795401" cy="1009703"/>
-          </a:xfrm>
-          <a:prstGeom prst="flowChartMultidocument">
+            <a:off x="205200" y="1275662"/>
+            <a:ext cx="2961220" cy="2793044"/>
+          </a:xfrm>
+          <a:prstGeom prst="rect">
             <a:avLst/>
           </a:prstGeom>
         </p:spPr>
-        <p:style>
-          <a:lnRef idx="2">
-            <a:schemeClr val="accent1">
-              <a:shade val="50000"/>
-            </a:schemeClr>
-          </a:lnRef>
-          <a:fillRef idx="1">
-            <a:schemeClr val="accent1"/>
-          </a:fillRef>
-          <a:effectRef idx="0">
-            <a:schemeClr val="accent1"/>
-          </a:effectRef>
-          <a:fontRef idx="minor">
-            <a:schemeClr val="lt1"/>
-          </a:fontRef>
-        </p:style>
-        <p:txBody>
-          <a:bodyPr rtlCol="0" anchor="ctr"/>
-          <a:lstStyle/>
-          <a:p>
-            <a:pPr algn="ctr"/>
-            <a:r>
-              <a:rPr lang="en-US" sz="700" dirty="0"/>
-              <a:t>Commercial office</a:t>
-            </a:r>
-          </a:p>
-        </p:txBody>
-      </p:sp>
-      <p:sp>
-        <p:nvSpPr>
-          <p:cNvPr id="10" name="Cloud 9">
-            <a:extLst>
-              <a:ext uri="{FF2B5EF4-FFF2-40B4-BE49-F238E27FC236}">
-                <a16:creationId xmlns:a16="http://schemas.microsoft.com/office/drawing/2014/main" id="{6BD5AEB7-F27F-4EA6-888E-C78CCD4DCD23}"/>
-              </a:ext>
-            </a:extLst>
-          </p:cNvPr>
-          <p:cNvSpPr/>
-          <p:nvPr/>
-        </p:nvSpPr>
-        <p:spPr>
-          <a:xfrm>
-            <a:off x="725923" y="3256762"/>
-            <a:ext cx="1117600" cy="856343"/>
-          </a:xfrm>
-          <a:prstGeom prst="cloud">
-            <a:avLst/>
-          </a:prstGeom>
-          <a:solidFill>
-            <a:schemeClr val="bg2">
-              <a:lumMod val="65000"/>
-            </a:schemeClr>
-          </a:solidFill>
-          <a:ln>
-            <a:solidFill>
-              <a:schemeClr val="tx2"/>
-            </a:solidFill>
-          </a:ln>
-        </p:spPr>
-        <p:style>
-          <a:lnRef idx="2">
-            <a:schemeClr val="accent1">
-              <a:shade val="50000"/>
-            </a:schemeClr>
-          </a:lnRef>
-          <a:fillRef idx="1">
-            <a:schemeClr val="accent1"/>
-          </a:fillRef>
-          <a:effectRef idx="0">
-            <a:schemeClr val="accent1"/>
-          </a:effectRef>
-          <a:fontRef idx="minor">
-            <a:schemeClr val="lt1"/>
-          </a:fontRef>
-        </p:style>
-        <p:txBody>
-          <a:bodyPr rtlCol="0" anchor="ctr"/>
-          <a:lstStyle/>
-          <a:p>
-            <a:pPr algn="ctr"/>
-            <a:r>
-              <a:rPr lang="es-AR" sz="1000" dirty="0" err="1"/>
-              <a:t>Paper</a:t>
-            </a:r>
-            <a:r>
-              <a:rPr lang="es-AR" sz="1000" dirty="0"/>
-              <a:t> </a:t>
-            </a:r>
-            <a:r>
-              <a:rPr lang="es-AR" sz="1000" dirty="0" err="1"/>
-              <a:t>waste</a:t>
-            </a:r>
-            <a:endParaRPr lang="es-AR" sz="1000" dirty="0"/>
-          </a:p>
-        </p:txBody>
-      </p:sp>
-      <p:sp>
-        <p:nvSpPr>
-          <p:cNvPr id="11" name="Arrow: Right 10">
-            <a:extLst>
-              <a:ext uri="{FF2B5EF4-FFF2-40B4-BE49-F238E27FC236}">
-                <a16:creationId xmlns:a16="http://schemas.microsoft.com/office/drawing/2014/main" id="{101FDFEE-C818-4F78-81C4-012FF38984F2}"/>
-              </a:ext>
-            </a:extLst>
-          </p:cNvPr>
-          <p:cNvSpPr/>
-          <p:nvPr/>
-        </p:nvSpPr>
-        <p:spPr>
-          <a:xfrm>
-            <a:off x="1875481" y="3060527"/>
-            <a:ext cx="1465943" cy="628087"/>
-          </a:xfrm>
-          <a:prstGeom prst="rightArrow">
-            <a:avLst/>
-          </a:prstGeom>
-        </p:spPr>
-        <p:style>
-          <a:lnRef idx="2">
-            <a:schemeClr val="accent1">
-              <a:shade val="50000"/>
-            </a:schemeClr>
-          </a:lnRef>
-          <a:fillRef idx="1">
-            <a:schemeClr val="accent1"/>
-          </a:fillRef>
-          <a:effectRef idx="0">
-            <a:schemeClr val="accent1"/>
-          </a:effectRef>
-          <a:fontRef idx="minor">
-            <a:schemeClr val="lt1"/>
-          </a:fontRef>
-        </p:style>
-        <p:txBody>
-          <a:bodyPr rtlCol="0" anchor="ctr"/>
-          <a:lstStyle/>
-          <a:p>
-            <a:pPr algn="ctr"/>
-            <a:r>
-              <a:rPr lang="en-US" sz="800" dirty="0"/>
-              <a:t>Informal collector</a:t>
-            </a:r>
-          </a:p>
-        </p:txBody>
-      </p:sp>
-      <p:sp>
-        <p:nvSpPr>
-          <p:cNvPr id="12" name="Arrow: Right 11">
-            <a:extLst>
-              <a:ext uri="{FF2B5EF4-FFF2-40B4-BE49-F238E27FC236}">
-                <a16:creationId xmlns:a16="http://schemas.microsoft.com/office/drawing/2014/main" id="{0E03BDA4-4A99-4B42-A4A2-D61471381810}"/>
-              </a:ext>
-            </a:extLst>
-          </p:cNvPr>
-          <p:cNvSpPr/>
-          <p:nvPr/>
-        </p:nvSpPr>
-        <p:spPr>
-          <a:xfrm>
-            <a:off x="4408224" y="3059964"/>
-            <a:ext cx="1465943" cy="628087"/>
-          </a:xfrm>
-          <a:prstGeom prst="rightArrow">
-            <a:avLst/>
-          </a:prstGeom>
-        </p:spPr>
-        <p:style>
-          <a:lnRef idx="2">
-            <a:schemeClr val="accent1">
-              <a:shade val="50000"/>
-            </a:schemeClr>
-          </a:lnRef>
-          <a:fillRef idx="1">
-            <a:schemeClr val="accent1"/>
-          </a:fillRef>
-          <a:effectRef idx="0">
-            <a:schemeClr val="accent1"/>
-          </a:effectRef>
-          <a:fontRef idx="minor">
-            <a:schemeClr val="lt1"/>
-          </a:fontRef>
-        </p:style>
-        <p:txBody>
-          <a:bodyPr rtlCol="0" anchor="ctr"/>
-          <a:lstStyle/>
-          <a:p>
-            <a:pPr algn="ctr"/>
-            <a:r>
-              <a:rPr lang="en-US" sz="800" dirty="0"/>
-              <a:t>SWM collection service</a:t>
-            </a:r>
-          </a:p>
-        </p:txBody>
-      </p:sp>
-      <p:sp>
-        <p:nvSpPr>
-          <p:cNvPr id="13" name="Flowchart: Multidocument 12">
-            <a:extLst>
-              <a:ext uri="{FF2B5EF4-FFF2-40B4-BE49-F238E27FC236}">
-                <a16:creationId xmlns:a16="http://schemas.microsoft.com/office/drawing/2014/main" id="{C028FE38-F1D7-4305-8667-698CD20339A7}"/>
-              </a:ext>
-            </a:extLst>
-          </p:cNvPr>
-          <p:cNvSpPr/>
-          <p:nvPr/>
-        </p:nvSpPr>
-        <p:spPr>
-          <a:xfrm>
-            <a:off x="3469945" y="2450169"/>
-            <a:ext cx="795401" cy="1009703"/>
-          </a:xfrm>
-          <a:prstGeom prst="flowChartMultidocument">
-            <a:avLst/>
-          </a:prstGeom>
-        </p:spPr>
-        <p:style>
-          <a:lnRef idx="2">
-            <a:schemeClr val="accent1">
-              <a:shade val="50000"/>
-            </a:schemeClr>
-          </a:lnRef>
-          <a:fillRef idx="1">
-            <a:schemeClr val="accent1"/>
-          </a:fillRef>
-          <a:effectRef idx="0">
-            <a:schemeClr val="accent1"/>
-          </a:effectRef>
-          <a:fontRef idx="minor">
-            <a:schemeClr val="lt1"/>
-          </a:fontRef>
-        </p:style>
-        <p:txBody>
-          <a:bodyPr rtlCol="0" anchor="ctr"/>
-          <a:lstStyle/>
-          <a:p>
-            <a:pPr algn="ctr"/>
-            <a:r>
-              <a:rPr lang="en-US" sz="700" dirty="0"/>
-              <a:t>Transfer station</a:t>
-            </a:r>
-          </a:p>
-        </p:txBody>
-      </p:sp>
-      <p:sp>
-        <p:nvSpPr>
-          <p:cNvPr id="14" name="Flowchart: Multidocument 13">
-            <a:extLst>
-              <a:ext uri="{FF2B5EF4-FFF2-40B4-BE49-F238E27FC236}">
-                <a16:creationId xmlns:a16="http://schemas.microsoft.com/office/drawing/2014/main" id="{943308AD-7884-49DB-A7F8-E1D1D15A8E29}"/>
-              </a:ext>
-            </a:extLst>
-          </p:cNvPr>
-          <p:cNvSpPr/>
-          <p:nvPr/>
-        </p:nvSpPr>
-        <p:spPr>
-          <a:xfrm>
-            <a:off x="6052867" y="2450169"/>
-            <a:ext cx="795401" cy="1009703"/>
-          </a:xfrm>
-          <a:prstGeom prst="flowChartMultidocument">
-            <a:avLst/>
-          </a:prstGeom>
-        </p:spPr>
-        <p:style>
-          <a:lnRef idx="2">
-            <a:schemeClr val="accent1">
-              <a:shade val="50000"/>
-            </a:schemeClr>
-          </a:lnRef>
-          <a:fillRef idx="1">
-            <a:schemeClr val="accent1"/>
-          </a:fillRef>
-          <a:effectRef idx="0">
-            <a:schemeClr val="accent1"/>
-          </a:effectRef>
-          <a:fontRef idx="minor">
-            <a:schemeClr val="lt1"/>
-          </a:fontRef>
-        </p:style>
-        <p:txBody>
-          <a:bodyPr rtlCol="0" anchor="ctr"/>
-          <a:lstStyle/>
-          <a:p>
-            <a:pPr algn="ctr"/>
-            <a:r>
-              <a:rPr lang="en-US" sz="700" dirty="0"/>
-              <a:t>Landfill</a:t>
-            </a:r>
-          </a:p>
-        </p:txBody>
-      </p:sp>
-      <p:sp>
-        <p:nvSpPr>
-          <p:cNvPr id="15" name="Cloud 14">
-            <a:extLst>
-              <a:ext uri="{FF2B5EF4-FFF2-40B4-BE49-F238E27FC236}">
-                <a16:creationId xmlns:a16="http://schemas.microsoft.com/office/drawing/2014/main" id="{35CC9DF9-5DBE-4282-BB20-09B2E8A2F43A}"/>
-              </a:ext>
-            </a:extLst>
-          </p:cNvPr>
-          <p:cNvSpPr/>
-          <p:nvPr/>
-        </p:nvSpPr>
-        <p:spPr>
-          <a:xfrm>
-            <a:off x="3288308" y="3254977"/>
-            <a:ext cx="1117600" cy="856343"/>
-          </a:xfrm>
-          <a:prstGeom prst="cloud">
-            <a:avLst/>
-          </a:prstGeom>
-          <a:solidFill>
-            <a:schemeClr val="bg2">
-              <a:lumMod val="65000"/>
-            </a:schemeClr>
-          </a:solidFill>
-          <a:ln>
-            <a:solidFill>
-              <a:schemeClr val="tx2"/>
-            </a:solidFill>
-          </a:ln>
-        </p:spPr>
-        <p:style>
-          <a:lnRef idx="2">
-            <a:schemeClr val="accent1">
-              <a:shade val="50000"/>
-            </a:schemeClr>
-          </a:lnRef>
-          <a:fillRef idx="1">
-            <a:schemeClr val="accent1"/>
-          </a:fillRef>
-          <a:effectRef idx="0">
-            <a:schemeClr val="accent1"/>
-          </a:effectRef>
-          <a:fontRef idx="minor">
-            <a:schemeClr val="lt1"/>
-          </a:fontRef>
-        </p:style>
-        <p:txBody>
-          <a:bodyPr rtlCol="0" anchor="ctr"/>
-          <a:lstStyle/>
-          <a:p>
-            <a:pPr algn="ctr"/>
-            <a:r>
-              <a:rPr lang="es-AR" sz="1000" dirty="0" err="1"/>
-              <a:t>Paper</a:t>
-            </a:r>
-            <a:r>
-              <a:rPr lang="es-AR" sz="1000" dirty="0"/>
-              <a:t> </a:t>
-            </a:r>
-            <a:r>
-              <a:rPr lang="es-AR" sz="1000" dirty="0" err="1"/>
-              <a:t>waste</a:t>
-            </a:r>
-            <a:endParaRPr lang="es-AR" sz="1000" dirty="0"/>
-          </a:p>
-        </p:txBody>
-      </p:sp>
-      <p:sp>
-        <p:nvSpPr>
-          <p:cNvPr id="17" name="Cloud 16">
-            <a:extLst>
-              <a:ext uri="{FF2B5EF4-FFF2-40B4-BE49-F238E27FC236}">
-                <a16:creationId xmlns:a16="http://schemas.microsoft.com/office/drawing/2014/main" id="{1508A4CA-5189-443E-A6AA-B01E35969626}"/>
-              </a:ext>
-            </a:extLst>
-          </p:cNvPr>
-          <p:cNvSpPr/>
-          <p:nvPr/>
-        </p:nvSpPr>
-        <p:spPr>
-          <a:xfrm>
-            <a:off x="5850694" y="3254977"/>
-            <a:ext cx="1117600" cy="856343"/>
-          </a:xfrm>
-          <a:prstGeom prst="cloud">
-            <a:avLst/>
-          </a:prstGeom>
-          <a:solidFill>
-            <a:schemeClr val="bg2">
-              <a:lumMod val="65000"/>
-            </a:schemeClr>
-          </a:solidFill>
-          <a:ln>
-            <a:solidFill>
-              <a:schemeClr val="tx2"/>
-            </a:solidFill>
-          </a:ln>
-        </p:spPr>
-        <p:style>
-          <a:lnRef idx="2">
-            <a:schemeClr val="accent1">
-              <a:shade val="50000"/>
-            </a:schemeClr>
-          </a:lnRef>
-          <a:fillRef idx="1">
-            <a:schemeClr val="accent1"/>
-          </a:fillRef>
-          <a:effectRef idx="0">
-            <a:schemeClr val="accent1"/>
-          </a:effectRef>
-          <a:fontRef idx="minor">
-            <a:schemeClr val="lt1"/>
-          </a:fontRef>
-        </p:style>
-        <p:txBody>
-          <a:bodyPr rtlCol="0" anchor="ctr"/>
-          <a:lstStyle/>
-          <a:p>
-            <a:pPr algn="ctr"/>
-            <a:r>
-              <a:rPr lang="es-AR" sz="1000" dirty="0" err="1"/>
-              <a:t>Paper</a:t>
-            </a:r>
-            <a:r>
-              <a:rPr lang="es-AR" sz="1000" dirty="0"/>
-              <a:t> </a:t>
-            </a:r>
-            <a:r>
-              <a:rPr lang="es-AR" sz="1000" dirty="0" err="1"/>
-              <a:t>waste</a:t>
-            </a:r>
-            <a:endParaRPr lang="es-AR" sz="1000" dirty="0"/>
-          </a:p>
-        </p:txBody>
-      </p:sp>
+      </p:pic>
     </p:spTree>
     <p:extLst>
       <p:ext uri="{BB962C8B-B14F-4D97-AF65-F5344CB8AC3E}">
-        <p14:creationId xmlns:p14="http://schemas.microsoft.com/office/powerpoint/2010/main" val="426121780"/>
+        <p14:creationId xmlns:p14="http://schemas.microsoft.com/office/powerpoint/2010/main" val="78915617"/>
       </p:ext>
     </p:extLst>
   </p:cSld>
@@ -12017,7 +11548,7 @@
           <a:p>
             <a:r>
               <a:rPr lang="en-US" dirty="0"/>
-              <a:t>Instances of the model - B</a:t>
+              <a:t>Instances of the model - A</a:t>
             </a:r>
             <a:endParaRPr lang="en-SE" dirty="0"/>
           </a:p>
@@ -12053,12 +11584,41 @@
           </a:p>
         </p:txBody>
       </p:sp>
-      <p:sp>
-        <p:nvSpPr>
-          <p:cNvPr id="10" name="Flowchart: Multidocument 9">
-            <a:extLst>
-              <a:ext uri="{FF2B5EF4-FFF2-40B4-BE49-F238E27FC236}">
-                <a16:creationId xmlns:a16="http://schemas.microsoft.com/office/drawing/2014/main" id="{F053C0A3-90CD-4AC5-9E24-85BE6A44651F}"/>
+      <p:pic>
+        <p:nvPicPr>
+          <p:cNvPr id="3" name="Content Placeholder 2" descr="A close up of a sign&#10;&#10;Description automatically generated">
+            <a:extLst>
+              <a:ext uri="{FF2B5EF4-FFF2-40B4-BE49-F238E27FC236}">
+                <a16:creationId xmlns:a16="http://schemas.microsoft.com/office/drawing/2014/main" id="{B496A107-C7E6-4E6B-AB64-60C6DBF4F432}"/>
+              </a:ext>
+            </a:extLst>
+          </p:cNvPr>
+          <p:cNvPicPr>
+            <a:picLocks noGrp="1" noChangeAspect="1"/>
+          </p:cNvPicPr>
+          <p:nvPr>
+            <p:ph idx="1"/>
+          </p:nvPr>
+        </p:nvPicPr>
+        <p:blipFill>
+          <a:blip r:embed="rId3"/>
+          <a:stretch>
+            <a:fillRect/>
+          </a:stretch>
+        </p:blipFill>
+        <p:spPr>
+          <a:xfrm>
+            <a:off x="725923" y="1108133"/>
+            <a:ext cx="6242371" cy="1009702"/>
+          </a:xfrm>
+        </p:spPr>
+      </p:pic>
+      <p:sp>
+        <p:nvSpPr>
+          <p:cNvPr id="8" name="Flowchart: Multidocument 7">
+            <a:extLst>
+              <a:ext uri="{FF2B5EF4-FFF2-40B4-BE49-F238E27FC236}">
+                <a16:creationId xmlns:a16="http://schemas.microsoft.com/office/drawing/2014/main" id="{E6A63554-8453-4CC4-97DB-90BEB8C02CBD}"/>
               </a:ext>
             </a:extLst>
           </p:cNvPr>
@@ -12067,7 +11627,7 @@
         </p:nvSpPr>
         <p:spPr>
           <a:xfrm>
-            <a:off x="468786" y="2973119"/>
+            <a:off x="887023" y="2450169"/>
             <a:ext cx="795401" cy="1009703"/>
           </a:xfrm>
           <a:prstGeom prst="flowChartMultidocument">
@@ -12097,17 +11657,17 @@
             <a:pPr algn="ctr"/>
             <a:r>
               <a:rPr lang="en-US" sz="700" dirty="0"/>
-              <a:t>Apple packhouse</a:t>
-            </a:r>
-          </a:p>
-        </p:txBody>
-      </p:sp>
-      <p:sp>
-        <p:nvSpPr>
-          <p:cNvPr id="11" name="Cloud 10">
-            <a:extLst>
-              <a:ext uri="{FF2B5EF4-FFF2-40B4-BE49-F238E27FC236}">
-                <a16:creationId xmlns:a16="http://schemas.microsoft.com/office/drawing/2014/main" id="{C039943E-014A-496F-B9B4-DB5F279ED343}"/>
+              <a:t>Commercial office</a:t>
+            </a:r>
+          </a:p>
+        </p:txBody>
+      </p:sp>
+      <p:sp>
+        <p:nvSpPr>
+          <p:cNvPr id="10" name="Cloud 9">
+            <a:extLst>
+              <a:ext uri="{FF2B5EF4-FFF2-40B4-BE49-F238E27FC236}">
+                <a16:creationId xmlns:a16="http://schemas.microsoft.com/office/drawing/2014/main" id="{6BD5AEB7-F27F-4EA6-888E-C78CCD4DCD23}"/>
               </a:ext>
             </a:extLst>
           </p:cNvPr>
@@ -12116,7 +11676,7 @@
         </p:nvSpPr>
         <p:spPr>
           <a:xfrm>
-            <a:off x="307686" y="3779712"/>
+            <a:off x="725923" y="3256762"/>
             <a:ext cx="1117600" cy="856343"/>
           </a:xfrm>
           <a:prstGeom prst="cloud">
@@ -12155,18 +11715,27 @@
           <a:p>
             <a:pPr algn="ctr"/>
             <a:r>
+              <a:rPr lang="es-AR" sz="1000" dirty="0" err="1"/>
+              <a:t>Paper</a:t>
+            </a:r>
+            <a:r>
               <a:rPr lang="es-AR" sz="1000" dirty="0"/>
-              <a:t>Wood pallets</a:t>
-            </a:r>
-          </a:p>
-        </p:txBody>
-      </p:sp>
-      <p:sp>
-        <p:nvSpPr>
-          <p:cNvPr id="12" name="Arrow: Right 11">
-            <a:extLst>
-              <a:ext uri="{FF2B5EF4-FFF2-40B4-BE49-F238E27FC236}">
-                <a16:creationId xmlns:a16="http://schemas.microsoft.com/office/drawing/2014/main" id="{21F36B77-FBBD-4456-8F00-63B007965513}"/>
+              <a:t> </a:t>
+            </a:r>
+            <a:r>
+              <a:rPr lang="es-AR" sz="1000" dirty="0" err="1"/>
+              <a:t>waste</a:t>
+            </a:r>
+            <a:endParaRPr lang="es-AR" sz="1000" dirty="0"/>
+          </a:p>
+        </p:txBody>
+      </p:sp>
+      <p:sp>
+        <p:nvSpPr>
+          <p:cNvPr id="11" name="Arrow: Right 10">
+            <a:extLst>
+              <a:ext uri="{FF2B5EF4-FFF2-40B4-BE49-F238E27FC236}">
+                <a16:creationId xmlns:a16="http://schemas.microsoft.com/office/drawing/2014/main" id="{101FDFEE-C818-4F78-81C4-012FF38984F2}"/>
               </a:ext>
             </a:extLst>
           </p:cNvPr>
@@ -12175,7 +11744,7 @@
         </p:nvSpPr>
         <p:spPr>
           <a:xfrm>
-            <a:off x="1457244" y="3583477"/>
+            <a:off x="1875481" y="3060527"/>
             <a:ext cx="1465943" cy="628087"/>
           </a:xfrm>
           <a:prstGeom prst="rightArrow">
@@ -12205,17 +11774,17 @@
             <a:pPr algn="ctr"/>
             <a:r>
               <a:rPr lang="en-US" sz="800" dirty="0"/>
-              <a:t>SWM collection service</a:t>
-            </a:r>
-          </a:p>
-        </p:txBody>
-      </p:sp>
-      <p:sp>
-        <p:nvSpPr>
-          <p:cNvPr id="13" name="Arrow: Right 12">
-            <a:extLst>
-              <a:ext uri="{FF2B5EF4-FFF2-40B4-BE49-F238E27FC236}">
-                <a16:creationId xmlns:a16="http://schemas.microsoft.com/office/drawing/2014/main" id="{0457B3AE-F62A-4BCA-A247-FF3422E5F015}"/>
+              <a:t>Informal collector</a:t>
+            </a:r>
+          </a:p>
+        </p:txBody>
+      </p:sp>
+      <p:sp>
+        <p:nvSpPr>
+          <p:cNvPr id="12" name="Arrow: Right 11">
+            <a:extLst>
+              <a:ext uri="{FF2B5EF4-FFF2-40B4-BE49-F238E27FC236}">
+                <a16:creationId xmlns:a16="http://schemas.microsoft.com/office/drawing/2014/main" id="{0E03BDA4-4A99-4B42-A4A2-D61471381810}"/>
               </a:ext>
             </a:extLst>
           </p:cNvPr>
@@ -12224,7 +11793,7 @@
         </p:nvSpPr>
         <p:spPr>
           <a:xfrm>
-            <a:off x="3989987" y="3582914"/>
+            <a:off x="4408224" y="3059964"/>
             <a:ext cx="1465943" cy="628087"/>
           </a:xfrm>
           <a:prstGeom prst="rightArrow">
@@ -12261,10 +11830,10 @@
       </p:sp>
       <p:sp>
         <p:nvSpPr>
-          <p:cNvPr id="14" name="Flowchart: Multidocument 13">
-            <a:extLst>
-              <a:ext uri="{FF2B5EF4-FFF2-40B4-BE49-F238E27FC236}">
-                <a16:creationId xmlns:a16="http://schemas.microsoft.com/office/drawing/2014/main" id="{D818FAEB-6159-4766-A92B-E3ADE8A2DCC9}"/>
+          <p:cNvPr id="13" name="Flowchart: Multidocument 12">
+            <a:extLst>
+              <a:ext uri="{FF2B5EF4-FFF2-40B4-BE49-F238E27FC236}">
+                <a16:creationId xmlns:a16="http://schemas.microsoft.com/office/drawing/2014/main" id="{C028FE38-F1D7-4305-8667-698CD20339A7}"/>
               </a:ext>
             </a:extLst>
           </p:cNvPr>
@@ -12273,7 +11842,7 @@
         </p:nvSpPr>
         <p:spPr>
           <a:xfrm>
-            <a:off x="3051708" y="2973119"/>
+            <a:off x="3469945" y="2450169"/>
             <a:ext cx="795401" cy="1009703"/>
           </a:xfrm>
           <a:prstGeom prst="flowChartMultidocument">
@@ -12303,17 +11872,17 @@
             <a:pPr algn="ctr"/>
             <a:r>
               <a:rPr lang="en-US" sz="700" dirty="0"/>
-              <a:t>Material warehouse</a:t>
-            </a:r>
-          </a:p>
-        </p:txBody>
-      </p:sp>
-      <p:sp>
-        <p:nvSpPr>
-          <p:cNvPr id="15" name="Flowchart: Multidocument 14">
-            <a:extLst>
-              <a:ext uri="{FF2B5EF4-FFF2-40B4-BE49-F238E27FC236}">
-                <a16:creationId xmlns:a16="http://schemas.microsoft.com/office/drawing/2014/main" id="{A7DAAD76-EDA9-40A6-BF58-3E1006E4C2DA}"/>
+              <a:t>Transfer station</a:t>
+            </a:r>
+          </a:p>
+        </p:txBody>
+      </p:sp>
+      <p:sp>
+        <p:nvSpPr>
+          <p:cNvPr id="14" name="Flowchart: Multidocument 13">
+            <a:extLst>
+              <a:ext uri="{FF2B5EF4-FFF2-40B4-BE49-F238E27FC236}">
+                <a16:creationId xmlns:a16="http://schemas.microsoft.com/office/drawing/2014/main" id="{943308AD-7884-49DB-A7F8-E1D1D15A8E29}"/>
               </a:ext>
             </a:extLst>
           </p:cNvPr>
@@ -12322,7 +11891,7 @@
         </p:nvSpPr>
         <p:spPr>
           <a:xfrm>
-            <a:off x="5634630" y="2973119"/>
+            <a:off x="6052867" y="2450169"/>
             <a:ext cx="795401" cy="1009703"/>
           </a:xfrm>
           <a:prstGeom prst="flowChartMultidocument">
@@ -12351,22 +11920,18 @@
           <a:p>
             <a:pPr algn="ctr"/>
             <a:r>
-              <a:rPr lang="sv-SE" sz="700" dirty="0"/>
-              <a:t>C</a:t>
-            </a:r>
-            <a:r>
               <a:rPr lang="en-US" sz="700" dirty="0"/>
-              <a:t>leaning process</a:t>
-            </a:r>
-          </a:p>
-        </p:txBody>
-      </p:sp>
-      <p:sp>
-        <p:nvSpPr>
-          <p:cNvPr id="16" name="Cloud 15">
-            <a:extLst>
-              <a:ext uri="{FF2B5EF4-FFF2-40B4-BE49-F238E27FC236}">
-                <a16:creationId xmlns:a16="http://schemas.microsoft.com/office/drawing/2014/main" id="{6662AB7C-3630-4BDC-A410-5134183DC422}"/>
+              <a:t>Landfill</a:t>
+            </a:r>
+          </a:p>
+        </p:txBody>
+      </p:sp>
+      <p:sp>
+        <p:nvSpPr>
+          <p:cNvPr id="15" name="Cloud 14">
+            <a:extLst>
+              <a:ext uri="{FF2B5EF4-FFF2-40B4-BE49-F238E27FC236}">
+                <a16:creationId xmlns:a16="http://schemas.microsoft.com/office/drawing/2014/main" id="{35CC9DF9-5DBE-4282-BB20-09B2E8A2F43A}"/>
               </a:ext>
             </a:extLst>
           </p:cNvPr>
@@ -12375,7 +11940,7 @@
         </p:nvSpPr>
         <p:spPr>
           <a:xfrm>
-            <a:off x="2870071" y="3777927"/>
+            <a:off x="3288308" y="3254977"/>
             <a:ext cx="1117600" cy="856343"/>
           </a:xfrm>
           <a:prstGeom prst="cloud">
@@ -12414,9 +11979,18 @@
           <a:p>
             <a:pPr algn="ctr"/>
             <a:r>
+              <a:rPr lang="es-AR" sz="1000" dirty="0" err="1"/>
+              <a:t>Paper</a:t>
+            </a:r>
+            <a:r>
               <a:rPr lang="es-AR" sz="1000" dirty="0"/>
-              <a:t>Wood pallets</a:t>
-            </a:r>
+              <a:t> </a:t>
+            </a:r>
+            <a:r>
+              <a:rPr lang="es-AR" sz="1000" dirty="0" err="1"/>
+              <a:t>waste</a:t>
+            </a:r>
+            <a:endParaRPr lang="es-AR" sz="1000" dirty="0"/>
           </a:p>
         </p:txBody>
       </p:sp>
@@ -12425,7 +11999,7 @@
           <p:cNvPr id="17" name="Cloud 16">
             <a:extLst>
               <a:ext uri="{FF2B5EF4-FFF2-40B4-BE49-F238E27FC236}">
-                <a16:creationId xmlns:a16="http://schemas.microsoft.com/office/drawing/2014/main" id="{1C9325BB-FECC-41AB-8B72-9CF8F3E9E2DC}"/>
+                <a16:creationId xmlns:a16="http://schemas.microsoft.com/office/drawing/2014/main" id="{1508A4CA-5189-443E-A6AA-B01E35969626}"/>
               </a:ext>
             </a:extLst>
           </p:cNvPr>
@@ -12434,7 +12008,7 @@
         </p:nvSpPr>
         <p:spPr>
           <a:xfrm>
-            <a:off x="5432457" y="3777927"/>
+            <a:off x="5850694" y="3254977"/>
             <a:ext cx="1117600" cy="856343"/>
           </a:xfrm>
           <a:prstGeom prst="cloud">
@@ -12473,212 +12047,25 @@
           <a:p>
             <a:pPr algn="ctr"/>
             <a:r>
+              <a:rPr lang="es-AR" sz="1000" dirty="0" err="1"/>
+              <a:t>Paper</a:t>
+            </a:r>
+            <a:r>
               <a:rPr lang="es-AR" sz="1000" dirty="0"/>
-              <a:t>Wood</a:t>
-            </a:r>
-          </a:p>
-        </p:txBody>
-      </p:sp>
-      <p:sp>
-        <p:nvSpPr>
-          <p:cNvPr id="18" name="Arrow: Right 17">
-            <a:extLst>
-              <a:ext uri="{FF2B5EF4-FFF2-40B4-BE49-F238E27FC236}">
-                <a16:creationId xmlns:a16="http://schemas.microsoft.com/office/drawing/2014/main" id="{CB726A69-A350-4123-94A7-EDAD4909E775}"/>
-              </a:ext>
-            </a:extLst>
-          </p:cNvPr>
-          <p:cNvSpPr/>
-          <p:nvPr/>
-        </p:nvSpPr>
-        <p:spPr>
-          <a:xfrm>
-            <a:off x="6572031" y="3582914"/>
-            <a:ext cx="1465943" cy="628087"/>
-          </a:xfrm>
-          <a:prstGeom prst="rightArrow">
-            <a:avLst/>
-          </a:prstGeom>
-        </p:spPr>
-        <p:style>
-          <a:lnRef idx="2">
-            <a:schemeClr val="accent1">
-              <a:shade val="50000"/>
-            </a:schemeClr>
-          </a:lnRef>
-          <a:fillRef idx="1">
-            <a:schemeClr val="accent1"/>
-          </a:fillRef>
-          <a:effectRef idx="0">
-            <a:schemeClr val="accent1"/>
-          </a:effectRef>
-          <a:fontRef idx="minor">
-            <a:schemeClr val="lt1"/>
-          </a:fontRef>
-        </p:style>
-        <p:txBody>
-          <a:bodyPr rtlCol="0" anchor="ctr"/>
-          <a:lstStyle/>
-          <a:p>
-            <a:pPr algn="ctr"/>
-            <a:r>
-              <a:rPr lang="en-US" sz="800" dirty="0"/>
-              <a:t>SWM collection service</a:t>
-            </a:r>
-          </a:p>
-        </p:txBody>
-      </p:sp>
-      <p:sp>
-        <p:nvSpPr>
-          <p:cNvPr id="19" name="Flowchart: Multidocument 18">
-            <a:extLst>
-              <a:ext uri="{FF2B5EF4-FFF2-40B4-BE49-F238E27FC236}">
-                <a16:creationId xmlns:a16="http://schemas.microsoft.com/office/drawing/2014/main" id="{2484CCD2-971F-4474-90D5-D55BCDF5B365}"/>
-              </a:ext>
-            </a:extLst>
-          </p:cNvPr>
-          <p:cNvSpPr/>
-          <p:nvPr/>
-        </p:nvSpPr>
-        <p:spPr>
-          <a:xfrm>
-            <a:off x="8216674" y="2973119"/>
-            <a:ext cx="795401" cy="1009703"/>
-          </a:xfrm>
-          <a:prstGeom prst="flowChartMultidocument">
-            <a:avLst/>
-          </a:prstGeom>
-        </p:spPr>
-        <p:style>
-          <a:lnRef idx="2">
-            <a:schemeClr val="accent1">
-              <a:shade val="50000"/>
-            </a:schemeClr>
-          </a:lnRef>
-          <a:fillRef idx="1">
-            <a:schemeClr val="accent1"/>
-          </a:fillRef>
-          <a:effectRef idx="0">
-            <a:schemeClr val="accent1"/>
-          </a:effectRef>
-          <a:fontRef idx="minor">
-            <a:schemeClr val="lt1"/>
-          </a:fontRef>
-        </p:style>
-        <p:txBody>
-          <a:bodyPr rtlCol="0" anchor="ctr"/>
-          <a:lstStyle/>
-          <a:p>
-            <a:pPr algn="ctr"/>
-            <a:r>
-              <a:rPr lang="sv-SE" sz="700" dirty="0"/>
-              <a:t>F</a:t>
-            </a:r>
-            <a:r>
-              <a:rPr lang="en-US" sz="700" dirty="0" err="1"/>
-              <a:t>urniture</a:t>
-            </a:r>
-            <a:r>
-              <a:rPr lang="en-US" sz="700" dirty="0"/>
-              <a:t> production</a:t>
-            </a:r>
-          </a:p>
-        </p:txBody>
-      </p:sp>
-      <p:sp>
-        <p:nvSpPr>
-          <p:cNvPr id="20" name="Cloud 19">
-            <a:extLst>
-              <a:ext uri="{FF2B5EF4-FFF2-40B4-BE49-F238E27FC236}">
-                <a16:creationId xmlns:a16="http://schemas.microsoft.com/office/drawing/2014/main" id="{9A5E2638-94FA-4145-AF09-6B4086202BDB}"/>
-              </a:ext>
-            </a:extLst>
-          </p:cNvPr>
-          <p:cNvSpPr/>
-          <p:nvPr/>
-        </p:nvSpPr>
-        <p:spPr>
-          <a:xfrm>
-            <a:off x="7989384" y="3777926"/>
-            <a:ext cx="1117600" cy="856343"/>
-          </a:xfrm>
-          <a:prstGeom prst="cloud">
-            <a:avLst/>
-          </a:prstGeom>
-          <a:solidFill>
-            <a:schemeClr val="bg2">
-              <a:lumMod val="65000"/>
-            </a:schemeClr>
-          </a:solidFill>
-          <a:ln>
-            <a:solidFill>
-              <a:schemeClr val="tx2"/>
-            </a:solidFill>
-          </a:ln>
-        </p:spPr>
-        <p:style>
-          <a:lnRef idx="2">
-            <a:schemeClr val="accent1">
-              <a:shade val="50000"/>
-            </a:schemeClr>
-          </a:lnRef>
-          <a:fillRef idx="1">
-            <a:schemeClr val="accent1"/>
-          </a:fillRef>
-          <a:effectRef idx="0">
-            <a:schemeClr val="accent1"/>
-          </a:effectRef>
-          <a:fontRef idx="minor">
-            <a:schemeClr val="lt1"/>
-          </a:fontRef>
-        </p:style>
-        <p:txBody>
-          <a:bodyPr rtlCol="0" anchor="ctr"/>
-          <a:lstStyle/>
-          <a:p>
-            <a:pPr algn="ctr"/>
+              <a:t> </a:t>
+            </a:r>
             <a:r>
               <a:rPr lang="es-AR" sz="1000" dirty="0" err="1"/>
-              <a:t>Furniture</a:t>
+              <a:t>waste</a:t>
             </a:r>
             <a:endParaRPr lang="es-AR" sz="1000" dirty="0"/>
           </a:p>
         </p:txBody>
       </p:sp>
-      <p:pic>
-        <p:nvPicPr>
-          <p:cNvPr id="23" name="Picture 22">
-            <a:extLst>
-              <a:ext uri="{FF2B5EF4-FFF2-40B4-BE49-F238E27FC236}">
-                <a16:creationId xmlns:a16="http://schemas.microsoft.com/office/drawing/2014/main" id="{6DC0B953-5A69-4F6B-A871-AEB50F2E6389}"/>
-              </a:ext>
-            </a:extLst>
-          </p:cNvPr>
-          <p:cNvPicPr>
-            <a:picLocks noChangeAspect="1"/>
-          </p:cNvPicPr>
-          <p:nvPr/>
-        </p:nvPicPr>
-        <p:blipFill>
-          <a:blip r:embed="rId3"/>
-          <a:stretch>
-            <a:fillRect/>
-          </a:stretch>
-        </p:blipFill>
-        <p:spPr>
-          <a:xfrm>
-            <a:off x="182546" y="1258954"/>
-            <a:ext cx="8778908" cy="1389172"/>
-          </a:xfrm>
-          <a:prstGeom prst="rect">
-            <a:avLst/>
-          </a:prstGeom>
-        </p:spPr>
-      </p:pic>
     </p:spTree>
     <p:extLst>
       <p:ext uri="{BB962C8B-B14F-4D97-AF65-F5344CB8AC3E}">
-        <p14:creationId xmlns:p14="http://schemas.microsoft.com/office/powerpoint/2010/main" val="48496408"/>
+        <p14:creationId xmlns:p14="http://schemas.microsoft.com/office/powerpoint/2010/main" val="426121780"/>
       </p:ext>
     </p:extLst>
   </p:cSld>
@@ -12733,7 +12120,7 @@
           <a:p>
             <a:r>
               <a:rPr lang="en-US" dirty="0"/>
-              <a:t>Instances of the model - C</a:t>
+              <a:t>Instances of the model - B</a:t>
             </a:r>
             <a:endParaRPr lang="en-SE" dirty="0"/>
           </a:p>
@@ -12769,41 +12156,12 @@
           </a:p>
         </p:txBody>
       </p:sp>
-      <p:pic>
-        <p:nvPicPr>
-          <p:cNvPr id="10" name="Content Placeholder 9" descr="A close up of a sign&#10;&#10;Description automatically generated">
-            <a:extLst>
-              <a:ext uri="{FF2B5EF4-FFF2-40B4-BE49-F238E27FC236}">
-                <a16:creationId xmlns:a16="http://schemas.microsoft.com/office/drawing/2014/main" id="{26C0518A-2FFC-48C2-AC2F-69588F068613}"/>
-              </a:ext>
-            </a:extLst>
-          </p:cNvPr>
-          <p:cNvPicPr>
-            <a:picLocks noGrp="1" noChangeAspect="1"/>
-          </p:cNvPicPr>
-          <p:nvPr>
-            <p:ph idx="1"/>
-          </p:nvPr>
-        </p:nvPicPr>
-        <p:blipFill>
-          <a:blip r:embed="rId3"/>
-          <a:stretch>
-            <a:fillRect/>
-          </a:stretch>
-        </p:blipFill>
-        <p:spPr>
-          <a:xfrm>
-            <a:off x="307686" y="933962"/>
-            <a:ext cx="6166167" cy="952549"/>
-          </a:xfrm>
-        </p:spPr>
-      </p:pic>
-      <p:sp>
-        <p:nvSpPr>
-          <p:cNvPr id="11" name="Flowchart: Multidocument 10">
-            <a:extLst>
-              <a:ext uri="{FF2B5EF4-FFF2-40B4-BE49-F238E27FC236}">
-                <a16:creationId xmlns:a16="http://schemas.microsoft.com/office/drawing/2014/main" id="{28341F1A-FAEF-4331-8B9E-571B9B63667A}"/>
+      <p:sp>
+        <p:nvSpPr>
+          <p:cNvPr id="10" name="Flowchart: Multidocument 9">
+            <a:extLst>
+              <a:ext uri="{FF2B5EF4-FFF2-40B4-BE49-F238E27FC236}">
+                <a16:creationId xmlns:a16="http://schemas.microsoft.com/office/drawing/2014/main" id="{F053C0A3-90CD-4AC5-9E24-85BE6A44651F}"/>
               </a:ext>
             </a:extLst>
           </p:cNvPr>
@@ -12812,7 +12170,7 @@
         </p:nvSpPr>
         <p:spPr>
           <a:xfrm>
-            <a:off x="468786" y="2174397"/>
+            <a:off x="468786" y="2973119"/>
             <a:ext cx="795401" cy="1009703"/>
           </a:xfrm>
           <a:prstGeom prst="flowChartMultidocument">
@@ -12842,17 +12200,17 @@
             <a:pPr algn="ctr"/>
             <a:r>
               <a:rPr lang="en-US" sz="700" dirty="0"/>
-              <a:t>Households</a:t>
-            </a:r>
-          </a:p>
-        </p:txBody>
-      </p:sp>
-      <p:sp>
-        <p:nvSpPr>
-          <p:cNvPr id="12" name="Cloud 11">
-            <a:extLst>
-              <a:ext uri="{FF2B5EF4-FFF2-40B4-BE49-F238E27FC236}">
-                <a16:creationId xmlns:a16="http://schemas.microsoft.com/office/drawing/2014/main" id="{FB35160F-AD9F-4E85-895D-AAC1CC97CDFA}"/>
+              <a:t>Apple packhouse</a:t>
+            </a:r>
+          </a:p>
+        </p:txBody>
+      </p:sp>
+      <p:sp>
+        <p:nvSpPr>
+          <p:cNvPr id="11" name="Cloud 10">
+            <a:extLst>
+              <a:ext uri="{FF2B5EF4-FFF2-40B4-BE49-F238E27FC236}">
+                <a16:creationId xmlns:a16="http://schemas.microsoft.com/office/drawing/2014/main" id="{C039943E-014A-496F-B9B4-DB5F279ED343}"/>
               </a:ext>
             </a:extLst>
           </p:cNvPr>
@@ -12861,7 +12219,7 @@
         </p:nvSpPr>
         <p:spPr>
           <a:xfrm>
-            <a:off x="307686" y="2980990"/>
+            <a:off x="307686" y="3779712"/>
             <a:ext cx="1117600" cy="856343"/>
           </a:xfrm>
           <a:prstGeom prst="cloud">
@@ -12900,27 +12258,18 @@
           <a:p>
             <a:pPr algn="ctr"/>
             <a:r>
-              <a:rPr lang="es-AR" sz="1000" dirty="0" err="1"/>
-              <a:t>Food</a:t>
-            </a:r>
-            <a:r>
               <a:rPr lang="es-AR" sz="1000" dirty="0"/>
-              <a:t> </a:t>
-            </a:r>
-            <a:r>
-              <a:rPr lang="es-AR" sz="1000" dirty="0" err="1"/>
-              <a:t>Waste</a:t>
-            </a:r>
-            <a:endParaRPr lang="es-AR" sz="1000" dirty="0"/>
-          </a:p>
-        </p:txBody>
-      </p:sp>
-      <p:sp>
-        <p:nvSpPr>
-          <p:cNvPr id="13" name="Arrow: Right 12">
-            <a:extLst>
-              <a:ext uri="{FF2B5EF4-FFF2-40B4-BE49-F238E27FC236}">
-                <a16:creationId xmlns:a16="http://schemas.microsoft.com/office/drawing/2014/main" id="{81687D7F-52F0-4D40-8F14-1A726AB81DCA}"/>
+              <a:t>Wood pallets</a:t>
+            </a:r>
+          </a:p>
+        </p:txBody>
+      </p:sp>
+      <p:sp>
+        <p:nvSpPr>
+          <p:cNvPr id="12" name="Arrow: Right 11">
+            <a:extLst>
+              <a:ext uri="{FF2B5EF4-FFF2-40B4-BE49-F238E27FC236}">
+                <a16:creationId xmlns:a16="http://schemas.microsoft.com/office/drawing/2014/main" id="{21F36B77-FBBD-4456-8F00-63B007965513}"/>
               </a:ext>
             </a:extLst>
           </p:cNvPr>
@@ -12929,7 +12278,7 @@
         </p:nvSpPr>
         <p:spPr>
           <a:xfrm>
-            <a:off x="1457244" y="2784755"/>
+            <a:off x="1457244" y="3583477"/>
             <a:ext cx="1465943" cy="628087"/>
           </a:xfrm>
           <a:prstGeom prst="rightArrow">
@@ -12966,10 +12315,10 @@
       </p:sp>
       <p:sp>
         <p:nvSpPr>
-          <p:cNvPr id="14" name="Arrow: Right 13">
-            <a:extLst>
-              <a:ext uri="{FF2B5EF4-FFF2-40B4-BE49-F238E27FC236}">
-                <a16:creationId xmlns:a16="http://schemas.microsoft.com/office/drawing/2014/main" id="{89AAFECB-001C-45F2-AA14-25300287343E}"/>
+          <p:cNvPr id="13" name="Arrow: Right 12">
+            <a:extLst>
+              <a:ext uri="{FF2B5EF4-FFF2-40B4-BE49-F238E27FC236}">
+                <a16:creationId xmlns:a16="http://schemas.microsoft.com/office/drawing/2014/main" id="{0457B3AE-F62A-4BCA-A247-FF3422E5F015}"/>
               </a:ext>
             </a:extLst>
           </p:cNvPr>
@@ -12978,7 +12327,7 @@
         </p:nvSpPr>
         <p:spPr>
           <a:xfrm>
-            <a:off x="3989987" y="2784192"/>
+            <a:off x="3989987" y="3582914"/>
             <a:ext cx="1465943" cy="628087"/>
           </a:xfrm>
           <a:prstGeom prst="rightArrow">
@@ -13015,10 +12364,10 @@
       </p:sp>
       <p:sp>
         <p:nvSpPr>
-          <p:cNvPr id="15" name="Flowchart: Multidocument 14">
-            <a:extLst>
-              <a:ext uri="{FF2B5EF4-FFF2-40B4-BE49-F238E27FC236}">
-                <a16:creationId xmlns:a16="http://schemas.microsoft.com/office/drawing/2014/main" id="{84F734BB-BD27-4B73-A73F-D65E5FF26FD8}"/>
+          <p:cNvPr id="14" name="Flowchart: Multidocument 13">
+            <a:extLst>
+              <a:ext uri="{FF2B5EF4-FFF2-40B4-BE49-F238E27FC236}">
+                <a16:creationId xmlns:a16="http://schemas.microsoft.com/office/drawing/2014/main" id="{D818FAEB-6159-4766-A92B-E3ADE8A2DCC9}"/>
               </a:ext>
             </a:extLst>
           </p:cNvPr>
@@ -13027,7 +12376,7 @@
         </p:nvSpPr>
         <p:spPr>
           <a:xfrm>
-            <a:off x="3051708" y="2174397"/>
+            <a:off x="3051708" y="2973119"/>
             <a:ext cx="795401" cy="1009703"/>
           </a:xfrm>
           <a:prstGeom prst="flowChartMultidocument">
@@ -13057,17 +12406,17 @@
             <a:pPr algn="ctr"/>
             <a:r>
               <a:rPr lang="en-US" sz="700" dirty="0"/>
-              <a:t>Transfer station</a:t>
-            </a:r>
-          </a:p>
-        </p:txBody>
-      </p:sp>
-      <p:sp>
-        <p:nvSpPr>
-          <p:cNvPr id="16" name="Flowchart: Multidocument 15">
-            <a:extLst>
-              <a:ext uri="{FF2B5EF4-FFF2-40B4-BE49-F238E27FC236}">
-                <a16:creationId xmlns:a16="http://schemas.microsoft.com/office/drawing/2014/main" id="{25A18E70-2CE1-42D6-A73D-EAD97CCBC2A5}"/>
+              <a:t>Material warehouse</a:t>
+            </a:r>
+          </a:p>
+        </p:txBody>
+      </p:sp>
+      <p:sp>
+        <p:nvSpPr>
+          <p:cNvPr id="15" name="Flowchart: Multidocument 14">
+            <a:extLst>
+              <a:ext uri="{FF2B5EF4-FFF2-40B4-BE49-F238E27FC236}">
+                <a16:creationId xmlns:a16="http://schemas.microsoft.com/office/drawing/2014/main" id="{A7DAAD76-EDA9-40A6-BF58-3E1006E4C2DA}"/>
               </a:ext>
             </a:extLst>
           </p:cNvPr>
@@ -13076,7 +12425,7 @@
         </p:nvSpPr>
         <p:spPr>
           <a:xfrm>
-            <a:off x="5634630" y="2174397"/>
+            <a:off x="5634630" y="2973119"/>
             <a:ext cx="795401" cy="1009703"/>
           </a:xfrm>
           <a:prstGeom prst="flowChartMultidocument">
@@ -13105,18 +12454,22 @@
           <a:p>
             <a:pPr algn="ctr"/>
             <a:r>
+              <a:rPr lang="sv-SE" sz="700" dirty="0"/>
+              <a:t>C</a:t>
+            </a:r>
+            <a:r>
               <a:rPr lang="en-US" sz="700" dirty="0"/>
-              <a:t>Incineration</a:t>
-            </a:r>
-          </a:p>
-        </p:txBody>
-      </p:sp>
-      <p:sp>
-        <p:nvSpPr>
-          <p:cNvPr id="17" name="Cloud 16">
-            <a:extLst>
-              <a:ext uri="{FF2B5EF4-FFF2-40B4-BE49-F238E27FC236}">
-                <a16:creationId xmlns:a16="http://schemas.microsoft.com/office/drawing/2014/main" id="{E051296E-5AEA-4848-A9FE-7DED00B75D04}"/>
+              <a:t>leaning process</a:t>
+            </a:r>
+          </a:p>
+        </p:txBody>
+      </p:sp>
+      <p:sp>
+        <p:nvSpPr>
+          <p:cNvPr id="16" name="Cloud 15">
+            <a:extLst>
+              <a:ext uri="{FF2B5EF4-FFF2-40B4-BE49-F238E27FC236}">
+                <a16:creationId xmlns:a16="http://schemas.microsoft.com/office/drawing/2014/main" id="{6662AB7C-3630-4BDC-A410-5134183DC422}"/>
               </a:ext>
             </a:extLst>
           </p:cNvPr>
@@ -13125,7 +12478,7 @@
         </p:nvSpPr>
         <p:spPr>
           <a:xfrm>
-            <a:off x="2870071" y="2979205"/>
+            <a:off x="2870071" y="3777927"/>
             <a:ext cx="1117600" cy="856343"/>
           </a:xfrm>
           <a:prstGeom prst="cloud">
@@ -13164,27 +12517,18 @@
           <a:p>
             <a:pPr algn="ctr"/>
             <a:r>
-              <a:rPr lang="es-AR" sz="1000" dirty="0" err="1"/>
-              <a:t>Food</a:t>
-            </a:r>
-            <a:r>
               <a:rPr lang="es-AR" sz="1000" dirty="0"/>
-              <a:t> </a:t>
-            </a:r>
-            <a:r>
-              <a:rPr lang="es-AR" sz="1000" dirty="0" err="1"/>
-              <a:t>waste</a:t>
-            </a:r>
-            <a:endParaRPr lang="es-AR" sz="1000" dirty="0"/>
-          </a:p>
-        </p:txBody>
-      </p:sp>
-      <p:sp>
-        <p:nvSpPr>
-          <p:cNvPr id="18" name="Cloud 17">
-            <a:extLst>
-              <a:ext uri="{FF2B5EF4-FFF2-40B4-BE49-F238E27FC236}">
-                <a16:creationId xmlns:a16="http://schemas.microsoft.com/office/drawing/2014/main" id="{CD567E07-5BE6-42E9-B771-ACA8978CE277}"/>
+              <a:t>Wood pallets</a:t>
+            </a:r>
+          </a:p>
+        </p:txBody>
+      </p:sp>
+      <p:sp>
+        <p:nvSpPr>
+          <p:cNvPr id="17" name="Cloud 16">
+            <a:extLst>
+              <a:ext uri="{FF2B5EF4-FFF2-40B4-BE49-F238E27FC236}">
+                <a16:creationId xmlns:a16="http://schemas.microsoft.com/office/drawing/2014/main" id="{1C9325BB-FECC-41AB-8B72-9CF8F3E9E2DC}"/>
               </a:ext>
             </a:extLst>
           </p:cNvPr>
@@ -13193,7 +12537,7 @@
         </p:nvSpPr>
         <p:spPr>
           <a:xfrm>
-            <a:off x="5432457" y="2979205"/>
+            <a:off x="5432457" y="3777927"/>
             <a:ext cx="1117600" cy="856343"/>
           </a:xfrm>
           <a:prstGeom prst="cloud">
@@ -13232,25 +12576,212 @@
           <a:p>
             <a:pPr algn="ctr"/>
             <a:r>
+              <a:rPr lang="es-AR" sz="1000" dirty="0"/>
+              <a:t>Wood</a:t>
+            </a:r>
+          </a:p>
+        </p:txBody>
+      </p:sp>
+      <p:sp>
+        <p:nvSpPr>
+          <p:cNvPr id="18" name="Arrow: Right 17">
+            <a:extLst>
+              <a:ext uri="{FF2B5EF4-FFF2-40B4-BE49-F238E27FC236}">
+                <a16:creationId xmlns:a16="http://schemas.microsoft.com/office/drawing/2014/main" id="{CB726A69-A350-4123-94A7-EDAD4909E775}"/>
+              </a:ext>
+            </a:extLst>
+          </p:cNvPr>
+          <p:cNvSpPr/>
+          <p:nvPr/>
+        </p:nvSpPr>
+        <p:spPr>
+          <a:xfrm>
+            <a:off x="6572031" y="3582914"/>
+            <a:ext cx="1465943" cy="628087"/>
+          </a:xfrm>
+          <a:prstGeom prst="rightArrow">
+            <a:avLst/>
+          </a:prstGeom>
+        </p:spPr>
+        <p:style>
+          <a:lnRef idx="2">
+            <a:schemeClr val="accent1">
+              <a:shade val="50000"/>
+            </a:schemeClr>
+          </a:lnRef>
+          <a:fillRef idx="1">
+            <a:schemeClr val="accent1"/>
+          </a:fillRef>
+          <a:effectRef idx="0">
+            <a:schemeClr val="accent1"/>
+          </a:effectRef>
+          <a:fontRef idx="minor">
+            <a:schemeClr val="lt1"/>
+          </a:fontRef>
+        </p:style>
+        <p:txBody>
+          <a:bodyPr rtlCol="0" anchor="ctr"/>
+          <a:lstStyle/>
+          <a:p>
+            <a:pPr algn="ctr"/>
+            <a:r>
+              <a:rPr lang="en-US" sz="800" dirty="0"/>
+              <a:t>SWM collection service</a:t>
+            </a:r>
+          </a:p>
+        </p:txBody>
+      </p:sp>
+      <p:sp>
+        <p:nvSpPr>
+          <p:cNvPr id="19" name="Flowchart: Multidocument 18">
+            <a:extLst>
+              <a:ext uri="{FF2B5EF4-FFF2-40B4-BE49-F238E27FC236}">
+                <a16:creationId xmlns:a16="http://schemas.microsoft.com/office/drawing/2014/main" id="{2484CCD2-971F-4474-90D5-D55BCDF5B365}"/>
+              </a:ext>
+            </a:extLst>
+          </p:cNvPr>
+          <p:cNvSpPr/>
+          <p:nvPr/>
+        </p:nvSpPr>
+        <p:spPr>
+          <a:xfrm>
+            <a:off x="8216674" y="2973119"/>
+            <a:ext cx="795401" cy="1009703"/>
+          </a:xfrm>
+          <a:prstGeom prst="flowChartMultidocument">
+            <a:avLst/>
+          </a:prstGeom>
+        </p:spPr>
+        <p:style>
+          <a:lnRef idx="2">
+            <a:schemeClr val="accent1">
+              <a:shade val="50000"/>
+            </a:schemeClr>
+          </a:lnRef>
+          <a:fillRef idx="1">
+            <a:schemeClr val="accent1"/>
+          </a:fillRef>
+          <a:effectRef idx="0">
+            <a:schemeClr val="accent1"/>
+          </a:effectRef>
+          <a:fontRef idx="minor">
+            <a:schemeClr val="lt1"/>
+          </a:fontRef>
+        </p:style>
+        <p:txBody>
+          <a:bodyPr rtlCol="0" anchor="ctr"/>
+          <a:lstStyle/>
+          <a:p>
+            <a:pPr algn="ctr"/>
+            <a:r>
+              <a:rPr lang="sv-SE" sz="700" dirty="0"/>
+              <a:t>F</a:t>
+            </a:r>
+            <a:r>
+              <a:rPr lang="en-US" sz="700" dirty="0" err="1"/>
+              <a:t>urniture</a:t>
+            </a:r>
+            <a:r>
+              <a:rPr lang="en-US" sz="700" dirty="0"/>
+              <a:t> production</a:t>
+            </a:r>
+          </a:p>
+        </p:txBody>
+      </p:sp>
+      <p:sp>
+        <p:nvSpPr>
+          <p:cNvPr id="20" name="Cloud 19">
+            <a:extLst>
+              <a:ext uri="{FF2B5EF4-FFF2-40B4-BE49-F238E27FC236}">
+                <a16:creationId xmlns:a16="http://schemas.microsoft.com/office/drawing/2014/main" id="{9A5E2638-94FA-4145-AF09-6B4086202BDB}"/>
+              </a:ext>
+            </a:extLst>
+          </p:cNvPr>
+          <p:cNvSpPr/>
+          <p:nvPr/>
+        </p:nvSpPr>
+        <p:spPr>
+          <a:xfrm>
+            <a:off x="7989384" y="3777926"/>
+            <a:ext cx="1117600" cy="856343"/>
+          </a:xfrm>
+          <a:prstGeom prst="cloud">
+            <a:avLst/>
+          </a:prstGeom>
+          <a:solidFill>
+            <a:schemeClr val="bg2">
+              <a:lumMod val="65000"/>
+            </a:schemeClr>
+          </a:solidFill>
+          <a:ln>
+            <a:solidFill>
+              <a:schemeClr val="tx2"/>
+            </a:solidFill>
+          </a:ln>
+        </p:spPr>
+        <p:style>
+          <a:lnRef idx="2">
+            <a:schemeClr val="accent1">
+              <a:shade val="50000"/>
+            </a:schemeClr>
+          </a:lnRef>
+          <a:fillRef idx="1">
+            <a:schemeClr val="accent1"/>
+          </a:fillRef>
+          <a:effectRef idx="0">
+            <a:schemeClr val="accent1"/>
+          </a:effectRef>
+          <a:fontRef idx="minor">
+            <a:schemeClr val="lt1"/>
+          </a:fontRef>
+        </p:style>
+        <p:txBody>
+          <a:bodyPr rtlCol="0" anchor="ctr"/>
+          <a:lstStyle/>
+          <a:p>
+            <a:pPr algn="ctr"/>
+            <a:r>
               <a:rPr lang="es-AR" sz="1000" dirty="0" err="1"/>
-              <a:t>Food</a:t>
-            </a:r>
-            <a:r>
-              <a:rPr lang="es-AR" sz="1000" dirty="0"/>
-              <a:t> </a:t>
-            </a:r>
-            <a:r>
-              <a:rPr lang="es-AR" sz="1000" dirty="0" err="1"/>
-              <a:t>Waste</a:t>
+              <a:t>Furniture</a:t>
             </a:r>
             <a:endParaRPr lang="es-AR" sz="1000" dirty="0"/>
           </a:p>
         </p:txBody>
       </p:sp>
+      <p:pic>
+        <p:nvPicPr>
+          <p:cNvPr id="23" name="Picture 22">
+            <a:extLst>
+              <a:ext uri="{FF2B5EF4-FFF2-40B4-BE49-F238E27FC236}">
+                <a16:creationId xmlns:a16="http://schemas.microsoft.com/office/drawing/2014/main" id="{6DC0B953-5A69-4F6B-A871-AEB50F2E6389}"/>
+              </a:ext>
+            </a:extLst>
+          </p:cNvPr>
+          <p:cNvPicPr>
+            <a:picLocks noChangeAspect="1"/>
+          </p:cNvPicPr>
+          <p:nvPr/>
+        </p:nvPicPr>
+        <p:blipFill>
+          <a:blip r:embed="rId3"/>
+          <a:stretch>
+            <a:fillRect/>
+          </a:stretch>
+        </p:blipFill>
+        <p:spPr>
+          <a:xfrm>
+            <a:off x="182546" y="1258954"/>
+            <a:ext cx="8778908" cy="1389172"/>
+          </a:xfrm>
+          <a:prstGeom prst="rect">
+            <a:avLst/>
+          </a:prstGeom>
+        </p:spPr>
+      </p:pic>
     </p:spTree>
     <p:extLst>
       <p:ext uri="{BB962C8B-B14F-4D97-AF65-F5344CB8AC3E}">
-        <p14:creationId xmlns:p14="http://schemas.microsoft.com/office/powerpoint/2010/main" val="2124008225"/>
+        <p14:creationId xmlns:p14="http://schemas.microsoft.com/office/powerpoint/2010/main" val="48496408"/>
       </p:ext>
     </p:extLst>
   </p:cSld>
@@ -13295,6 +12826,578 @@
         </p:nvSpPr>
         <p:spPr>
           <a:xfrm>
+            <a:off x="307686" y="346538"/>
+            <a:ext cx="7038231" cy="587424"/>
+          </a:xfrm>
+        </p:spPr>
+        <p:txBody>
+          <a:bodyPr anchor="t"/>
+          <a:lstStyle/>
+          <a:p>
+            <a:r>
+              <a:rPr lang="en-US" dirty="0"/>
+              <a:t>Instances of the model - C</a:t>
+            </a:r>
+            <a:endParaRPr lang="en-SE" dirty="0"/>
+          </a:p>
+        </p:txBody>
+      </p:sp>
+      <p:sp>
+        <p:nvSpPr>
+          <p:cNvPr id="4" name="Slide Number Placeholder 3">
+            <a:extLst>
+              <a:ext uri="{FF2B5EF4-FFF2-40B4-BE49-F238E27FC236}">
+                <a16:creationId xmlns:a16="http://schemas.microsoft.com/office/drawing/2014/main" id="{9680D3BE-20F5-244F-9E06-27645F244A36}"/>
+              </a:ext>
+            </a:extLst>
+          </p:cNvPr>
+          <p:cNvSpPr>
+            <a:spLocks noGrp="1"/>
+          </p:cNvSpPr>
+          <p:nvPr>
+            <p:ph type="sldNum" sz="quarter" idx="12"/>
+          </p:nvPr>
+        </p:nvSpPr>
+        <p:spPr/>
+        <p:txBody>
+          <a:bodyPr/>
+          <a:lstStyle/>
+          <a:p>
+            <a:fld id="{988E7F75-8447-2546-BC2C-A9D2B7675F08}" type="slidenum">
+              <a:rPr lang="en-GB" smtClean="0"/>
+              <a:pPr/>
+              <a:t>17</a:t>
+            </a:fld>
+            <a:endParaRPr lang="en-GB" dirty="0"/>
+          </a:p>
+        </p:txBody>
+      </p:sp>
+      <p:pic>
+        <p:nvPicPr>
+          <p:cNvPr id="10" name="Content Placeholder 9" descr="A close up of a sign&#10;&#10;Description automatically generated">
+            <a:extLst>
+              <a:ext uri="{FF2B5EF4-FFF2-40B4-BE49-F238E27FC236}">
+                <a16:creationId xmlns:a16="http://schemas.microsoft.com/office/drawing/2014/main" id="{26C0518A-2FFC-48C2-AC2F-69588F068613}"/>
+              </a:ext>
+            </a:extLst>
+          </p:cNvPr>
+          <p:cNvPicPr>
+            <a:picLocks noGrp="1" noChangeAspect="1"/>
+          </p:cNvPicPr>
+          <p:nvPr>
+            <p:ph idx="1"/>
+          </p:nvPr>
+        </p:nvPicPr>
+        <p:blipFill>
+          <a:blip r:embed="rId3"/>
+          <a:stretch>
+            <a:fillRect/>
+          </a:stretch>
+        </p:blipFill>
+        <p:spPr>
+          <a:xfrm>
+            <a:off x="307686" y="933962"/>
+            <a:ext cx="6166167" cy="952549"/>
+          </a:xfrm>
+        </p:spPr>
+      </p:pic>
+      <p:sp>
+        <p:nvSpPr>
+          <p:cNvPr id="11" name="Flowchart: Multidocument 10">
+            <a:extLst>
+              <a:ext uri="{FF2B5EF4-FFF2-40B4-BE49-F238E27FC236}">
+                <a16:creationId xmlns:a16="http://schemas.microsoft.com/office/drawing/2014/main" id="{28341F1A-FAEF-4331-8B9E-571B9B63667A}"/>
+              </a:ext>
+            </a:extLst>
+          </p:cNvPr>
+          <p:cNvSpPr/>
+          <p:nvPr/>
+        </p:nvSpPr>
+        <p:spPr>
+          <a:xfrm>
+            <a:off x="468786" y="2174397"/>
+            <a:ext cx="795401" cy="1009703"/>
+          </a:xfrm>
+          <a:prstGeom prst="flowChartMultidocument">
+            <a:avLst/>
+          </a:prstGeom>
+        </p:spPr>
+        <p:style>
+          <a:lnRef idx="2">
+            <a:schemeClr val="accent1">
+              <a:shade val="50000"/>
+            </a:schemeClr>
+          </a:lnRef>
+          <a:fillRef idx="1">
+            <a:schemeClr val="accent1"/>
+          </a:fillRef>
+          <a:effectRef idx="0">
+            <a:schemeClr val="accent1"/>
+          </a:effectRef>
+          <a:fontRef idx="minor">
+            <a:schemeClr val="lt1"/>
+          </a:fontRef>
+        </p:style>
+        <p:txBody>
+          <a:bodyPr rtlCol="0" anchor="ctr"/>
+          <a:lstStyle/>
+          <a:p>
+            <a:pPr algn="ctr"/>
+            <a:r>
+              <a:rPr lang="en-US" sz="700" dirty="0"/>
+              <a:t>Households</a:t>
+            </a:r>
+          </a:p>
+        </p:txBody>
+      </p:sp>
+      <p:sp>
+        <p:nvSpPr>
+          <p:cNvPr id="12" name="Cloud 11">
+            <a:extLst>
+              <a:ext uri="{FF2B5EF4-FFF2-40B4-BE49-F238E27FC236}">
+                <a16:creationId xmlns:a16="http://schemas.microsoft.com/office/drawing/2014/main" id="{FB35160F-AD9F-4E85-895D-AAC1CC97CDFA}"/>
+              </a:ext>
+            </a:extLst>
+          </p:cNvPr>
+          <p:cNvSpPr/>
+          <p:nvPr/>
+        </p:nvSpPr>
+        <p:spPr>
+          <a:xfrm>
+            <a:off x="307686" y="2980990"/>
+            <a:ext cx="1117600" cy="856343"/>
+          </a:xfrm>
+          <a:prstGeom prst="cloud">
+            <a:avLst/>
+          </a:prstGeom>
+          <a:solidFill>
+            <a:schemeClr val="bg2">
+              <a:lumMod val="65000"/>
+            </a:schemeClr>
+          </a:solidFill>
+          <a:ln>
+            <a:solidFill>
+              <a:schemeClr val="tx2"/>
+            </a:solidFill>
+          </a:ln>
+        </p:spPr>
+        <p:style>
+          <a:lnRef idx="2">
+            <a:schemeClr val="accent1">
+              <a:shade val="50000"/>
+            </a:schemeClr>
+          </a:lnRef>
+          <a:fillRef idx="1">
+            <a:schemeClr val="accent1"/>
+          </a:fillRef>
+          <a:effectRef idx="0">
+            <a:schemeClr val="accent1"/>
+          </a:effectRef>
+          <a:fontRef idx="minor">
+            <a:schemeClr val="lt1"/>
+          </a:fontRef>
+        </p:style>
+        <p:txBody>
+          <a:bodyPr rtlCol="0" anchor="ctr"/>
+          <a:lstStyle/>
+          <a:p>
+            <a:pPr algn="ctr"/>
+            <a:r>
+              <a:rPr lang="es-AR" sz="1000" dirty="0" err="1"/>
+              <a:t>Food</a:t>
+            </a:r>
+            <a:r>
+              <a:rPr lang="es-AR" sz="1000" dirty="0"/>
+              <a:t> </a:t>
+            </a:r>
+            <a:r>
+              <a:rPr lang="es-AR" sz="1000" dirty="0" err="1"/>
+              <a:t>Waste</a:t>
+            </a:r>
+            <a:endParaRPr lang="es-AR" sz="1000" dirty="0"/>
+          </a:p>
+        </p:txBody>
+      </p:sp>
+      <p:sp>
+        <p:nvSpPr>
+          <p:cNvPr id="13" name="Arrow: Right 12">
+            <a:extLst>
+              <a:ext uri="{FF2B5EF4-FFF2-40B4-BE49-F238E27FC236}">
+                <a16:creationId xmlns:a16="http://schemas.microsoft.com/office/drawing/2014/main" id="{81687D7F-52F0-4D40-8F14-1A726AB81DCA}"/>
+              </a:ext>
+            </a:extLst>
+          </p:cNvPr>
+          <p:cNvSpPr/>
+          <p:nvPr/>
+        </p:nvSpPr>
+        <p:spPr>
+          <a:xfrm>
+            <a:off x="1457244" y="2784755"/>
+            <a:ext cx="1465943" cy="628087"/>
+          </a:xfrm>
+          <a:prstGeom prst="rightArrow">
+            <a:avLst/>
+          </a:prstGeom>
+        </p:spPr>
+        <p:style>
+          <a:lnRef idx="2">
+            <a:schemeClr val="accent1">
+              <a:shade val="50000"/>
+            </a:schemeClr>
+          </a:lnRef>
+          <a:fillRef idx="1">
+            <a:schemeClr val="accent1"/>
+          </a:fillRef>
+          <a:effectRef idx="0">
+            <a:schemeClr val="accent1"/>
+          </a:effectRef>
+          <a:fontRef idx="minor">
+            <a:schemeClr val="lt1"/>
+          </a:fontRef>
+        </p:style>
+        <p:txBody>
+          <a:bodyPr rtlCol="0" anchor="ctr"/>
+          <a:lstStyle/>
+          <a:p>
+            <a:pPr algn="ctr"/>
+            <a:r>
+              <a:rPr lang="en-US" sz="800" dirty="0"/>
+              <a:t>SWM collection service</a:t>
+            </a:r>
+          </a:p>
+        </p:txBody>
+      </p:sp>
+      <p:sp>
+        <p:nvSpPr>
+          <p:cNvPr id="14" name="Arrow: Right 13">
+            <a:extLst>
+              <a:ext uri="{FF2B5EF4-FFF2-40B4-BE49-F238E27FC236}">
+                <a16:creationId xmlns:a16="http://schemas.microsoft.com/office/drawing/2014/main" id="{89AAFECB-001C-45F2-AA14-25300287343E}"/>
+              </a:ext>
+            </a:extLst>
+          </p:cNvPr>
+          <p:cNvSpPr/>
+          <p:nvPr/>
+        </p:nvSpPr>
+        <p:spPr>
+          <a:xfrm>
+            <a:off x="3989987" y="2784192"/>
+            <a:ext cx="1465943" cy="628087"/>
+          </a:xfrm>
+          <a:prstGeom prst="rightArrow">
+            <a:avLst/>
+          </a:prstGeom>
+        </p:spPr>
+        <p:style>
+          <a:lnRef idx="2">
+            <a:schemeClr val="accent1">
+              <a:shade val="50000"/>
+            </a:schemeClr>
+          </a:lnRef>
+          <a:fillRef idx="1">
+            <a:schemeClr val="accent1"/>
+          </a:fillRef>
+          <a:effectRef idx="0">
+            <a:schemeClr val="accent1"/>
+          </a:effectRef>
+          <a:fontRef idx="minor">
+            <a:schemeClr val="lt1"/>
+          </a:fontRef>
+        </p:style>
+        <p:txBody>
+          <a:bodyPr rtlCol="0" anchor="ctr"/>
+          <a:lstStyle/>
+          <a:p>
+            <a:pPr algn="ctr"/>
+            <a:r>
+              <a:rPr lang="en-US" sz="800" dirty="0"/>
+              <a:t>SWM collection service</a:t>
+            </a:r>
+          </a:p>
+        </p:txBody>
+      </p:sp>
+      <p:sp>
+        <p:nvSpPr>
+          <p:cNvPr id="15" name="Flowchart: Multidocument 14">
+            <a:extLst>
+              <a:ext uri="{FF2B5EF4-FFF2-40B4-BE49-F238E27FC236}">
+                <a16:creationId xmlns:a16="http://schemas.microsoft.com/office/drawing/2014/main" id="{84F734BB-BD27-4B73-A73F-D65E5FF26FD8}"/>
+              </a:ext>
+            </a:extLst>
+          </p:cNvPr>
+          <p:cNvSpPr/>
+          <p:nvPr/>
+        </p:nvSpPr>
+        <p:spPr>
+          <a:xfrm>
+            <a:off x="3051708" y="2174397"/>
+            <a:ext cx="795401" cy="1009703"/>
+          </a:xfrm>
+          <a:prstGeom prst="flowChartMultidocument">
+            <a:avLst/>
+          </a:prstGeom>
+        </p:spPr>
+        <p:style>
+          <a:lnRef idx="2">
+            <a:schemeClr val="accent1">
+              <a:shade val="50000"/>
+            </a:schemeClr>
+          </a:lnRef>
+          <a:fillRef idx="1">
+            <a:schemeClr val="accent1"/>
+          </a:fillRef>
+          <a:effectRef idx="0">
+            <a:schemeClr val="accent1"/>
+          </a:effectRef>
+          <a:fontRef idx="minor">
+            <a:schemeClr val="lt1"/>
+          </a:fontRef>
+        </p:style>
+        <p:txBody>
+          <a:bodyPr rtlCol="0" anchor="ctr"/>
+          <a:lstStyle/>
+          <a:p>
+            <a:pPr algn="ctr"/>
+            <a:r>
+              <a:rPr lang="en-US" sz="700" dirty="0"/>
+              <a:t>Transfer station</a:t>
+            </a:r>
+          </a:p>
+        </p:txBody>
+      </p:sp>
+      <p:sp>
+        <p:nvSpPr>
+          <p:cNvPr id="16" name="Flowchart: Multidocument 15">
+            <a:extLst>
+              <a:ext uri="{FF2B5EF4-FFF2-40B4-BE49-F238E27FC236}">
+                <a16:creationId xmlns:a16="http://schemas.microsoft.com/office/drawing/2014/main" id="{25A18E70-2CE1-42D6-A73D-EAD97CCBC2A5}"/>
+              </a:ext>
+            </a:extLst>
+          </p:cNvPr>
+          <p:cNvSpPr/>
+          <p:nvPr/>
+        </p:nvSpPr>
+        <p:spPr>
+          <a:xfrm>
+            <a:off x="5634630" y="2174397"/>
+            <a:ext cx="795401" cy="1009703"/>
+          </a:xfrm>
+          <a:prstGeom prst="flowChartMultidocument">
+            <a:avLst/>
+          </a:prstGeom>
+        </p:spPr>
+        <p:style>
+          <a:lnRef idx="2">
+            <a:schemeClr val="accent1">
+              <a:shade val="50000"/>
+            </a:schemeClr>
+          </a:lnRef>
+          <a:fillRef idx="1">
+            <a:schemeClr val="accent1"/>
+          </a:fillRef>
+          <a:effectRef idx="0">
+            <a:schemeClr val="accent1"/>
+          </a:effectRef>
+          <a:fontRef idx="minor">
+            <a:schemeClr val="lt1"/>
+          </a:fontRef>
+        </p:style>
+        <p:txBody>
+          <a:bodyPr rtlCol="0" anchor="ctr"/>
+          <a:lstStyle/>
+          <a:p>
+            <a:pPr algn="ctr"/>
+            <a:r>
+              <a:rPr lang="en-US" sz="700" dirty="0"/>
+              <a:t>Incineration</a:t>
+            </a:r>
+          </a:p>
+        </p:txBody>
+      </p:sp>
+      <p:sp>
+        <p:nvSpPr>
+          <p:cNvPr id="17" name="Cloud 16">
+            <a:extLst>
+              <a:ext uri="{FF2B5EF4-FFF2-40B4-BE49-F238E27FC236}">
+                <a16:creationId xmlns:a16="http://schemas.microsoft.com/office/drawing/2014/main" id="{E051296E-5AEA-4848-A9FE-7DED00B75D04}"/>
+              </a:ext>
+            </a:extLst>
+          </p:cNvPr>
+          <p:cNvSpPr/>
+          <p:nvPr/>
+        </p:nvSpPr>
+        <p:spPr>
+          <a:xfrm>
+            <a:off x="2870071" y="2979205"/>
+            <a:ext cx="1117600" cy="856343"/>
+          </a:xfrm>
+          <a:prstGeom prst="cloud">
+            <a:avLst/>
+          </a:prstGeom>
+          <a:solidFill>
+            <a:schemeClr val="bg2">
+              <a:lumMod val="65000"/>
+            </a:schemeClr>
+          </a:solidFill>
+          <a:ln>
+            <a:solidFill>
+              <a:schemeClr val="tx2"/>
+            </a:solidFill>
+          </a:ln>
+        </p:spPr>
+        <p:style>
+          <a:lnRef idx="2">
+            <a:schemeClr val="accent1">
+              <a:shade val="50000"/>
+            </a:schemeClr>
+          </a:lnRef>
+          <a:fillRef idx="1">
+            <a:schemeClr val="accent1"/>
+          </a:fillRef>
+          <a:effectRef idx="0">
+            <a:schemeClr val="accent1"/>
+          </a:effectRef>
+          <a:fontRef idx="minor">
+            <a:schemeClr val="lt1"/>
+          </a:fontRef>
+        </p:style>
+        <p:txBody>
+          <a:bodyPr rtlCol="0" anchor="ctr"/>
+          <a:lstStyle/>
+          <a:p>
+            <a:pPr algn="ctr"/>
+            <a:r>
+              <a:rPr lang="es-AR" sz="1000" dirty="0" err="1"/>
+              <a:t>Food</a:t>
+            </a:r>
+            <a:r>
+              <a:rPr lang="es-AR" sz="1000" dirty="0"/>
+              <a:t> </a:t>
+            </a:r>
+            <a:r>
+              <a:rPr lang="es-AR" sz="1000" dirty="0" err="1"/>
+              <a:t>waste</a:t>
+            </a:r>
+            <a:endParaRPr lang="es-AR" sz="1000" dirty="0"/>
+          </a:p>
+        </p:txBody>
+      </p:sp>
+      <p:sp>
+        <p:nvSpPr>
+          <p:cNvPr id="18" name="Cloud 17">
+            <a:extLst>
+              <a:ext uri="{FF2B5EF4-FFF2-40B4-BE49-F238E27FC236}">
+                <a16:creationId xmlns:a16="http://schemas.microsoft.com/office/drawing/2014/main" id="{CD567E07-5BE6-42E9-B771-ACA8978CE277}"/>
+              </a:ext>
+            </a:extLst>
+          </p:cNvPr>
+          <p:cNvSpPr/>
+          <p:nvPr/>
+        </p:nvSpPr>
+        <p:spPr>
+          <a:xfrm>
+            <a:off x="5432457" y="2979205"/>
+            <a:ext cx="1117600" cy="856343"/>
+          </a:xfrm>
+          <a:prstGeom prst="cloud">
+            <a:avLst/>
+          </a:prstGeom>
+          <a:solidFill>
+            <a:schemeClr val="bg2">
+              <a:lumMod val="65000"/>
+            </a:schemeClr>
+          </a:solidFill>
+          <a:ln>
+            <a:solidFill>
+              <a:schemeClr val="tx2"/>
+            </a:solidFill>
+          </a:ln>
+        </p:spPr>
+        <p:style>
+          <a:lnRef idx="2">
+            <a:schemeClr val="accent1">
+              <a:shade val="50000"/>
+            </a:schemeClr>
+          </a:lnRef>
+          <a:fillRef idx="1">
+            <a:schemeClr val="accent1"/>
+          </a:fillRef>
+          <a:effectRef idx="0">
+            <a:schemeClr val="accent1"/>
+          </a:effectRef>
+          <a:fontRef idx="minor">
+            <a:schemeClr val="lt1"/>
+          </a:fontRef>
+        </p:style>
+        <p:txBody>
+          <a:bodyPr rtlCol="0" anchor="ctr"/>
+          <a:lstStyle/>
+          <a:p>
+            <a:pPr algn="ctr"/>
+            <a:r>
+              <a:rPr lang="es-AR" sz="1000" dirty="0" err="1"/>
+              <a:t>Food</a:t>
+            </a:r>
+            <a:r>
+              <a:rPr lang="es-AR" sz="1000" dirty="0"/>
+              <a:t> </a:t>
+            </a:r>
+            <a:r>
+              <a:rPr lang="es-AR" sz="1000" dirty="0" err="1"/>
+              <a:t>Waste</a:t>
+            </a:r>
+            <a:endParaRPr lang="es-AR" sz="1000" dirty="0"/>
+          </a:p>
+        </p:txBody>
+      </p:sp>
+    </p:spTree>
+    <p:extLst>
+      <p:ext uri="{BB962C8B-B14F-4D97-AF65-F5344CB8AC3E}">
+        <p14:creationId xmlns:p14="http://schemas.microsoft.com/office/powerpoint/2010/main" val="2124008225"/>
+      </p:ext>
+    </p:extLst>
+  </p:cSld>
+  <p:clrMapOvr>
+    <a:masterClrMapping/>
+  </p:clrMapOvr>
+</p:sld>
+</file>
+
+<file path=ppt/slides/slide18.xml><?xml version="1.0" encoding="utf-8"?>
+<p:sld xmlns:a="http://schemas.openxmlformats.org/drawingml/2006/main" xmlns:r="http://schemas.openxmlformats.org/officeDocument/2006/relationships" xmlns:p="http://schemas.openxmlformats.org/presentationml/2006/main">
+  <p:cSld>
+    <p:spTree>
+      <p:nvGrpSpPr>
+        <p:cNvPr id="1" name=""/>
+        <p:cNvGrpSpPr/>
+        <p:nvPr/>
+      </p:nvGrpSpPr>
+      <p:grpSpPr>
+        <a:xfrm>
+          <a:off x="0" y="0"/>
+          <a:ext cx="0" cy="0"/>
+          <a:chOff x="0" y="0"/>
+          <a:chExt cx="0" cy="0"/>
+        </a:xfrm>
+      </p:grpSpPr>
+      <p:sp>
+        <p:nvSpPr>
+          <p:cNvPr id="6" name="Title 5">
+            <a:extLst>
+              <a:ext uri="{FF2B5EF4-FFF2-40B4-BE49-F238E27FC236}">
+                <a16:creationId xmlns:a16="http://schemas.microsoft.com/office/drawing/2014/main" id="{0CF42AA4-2B62-A749-AA91-1089FE0EF731}"/>
+              </a:ext>
+            </a:extLst>
+          </p:cNvPr>
+          <p:cNvSpPr>
+            <a:spLocks noGrp="1"/>
+          </p:cNvSpPr>
+          <p:nvPr>
+            <p:ph type="title"/>
+          </p:nvPr>
+        </p:nvSpPr>
+        <p:spPr>
+          <a:xfrm>
             <a:off x="1783071" y="1524000"/>
             <a:ext cx="5577857" cy="1341462"/>
           </a:xfrm>
@@ -13344,7 +13447,7 @@
             <a:fld id="{988E7F75-8447-2546-BC2C-A9D2B7675F08}" type="slidenum">
               <a:rPr lang="en-GB" smtClean="0"/>
               <a:pPr/>
-              <a:t>17</a:t>
+              <a:t>18</a:t>
             </a:fld>
             <a:endParaRPr lang="en-GB" dirty="0"/>
           </a:p>
@@ -13363,7 +13466,7 @@
 </p:sld>
 </file>
 
-<file path=ppt/slides/slide18.xml><?xml version="1.0" encoding="utf-8"?>
+<file path=ppt/slides/slide19.xml><?xml version="1.0" encoding="utf-8"?>
 <p:sld xmlns:a="http://schemas.openxmlformats.org/drawingml/2006/main" xmlns:r="http://schemas.openxmlformats.org/officeDocument/2006/relationships" xmlns:p="http://schemas.openxmlformats.org/presentationml/2006/main">
   <p:cSld>
     <p:spTree>
@@ -14171,36 +14274,38 @@
           </a:p>
         </p:txBody>
       </p:sp>
-      <p:sp>
-        <p:nvSpPr>
-          <p:cNvPr id="3" name="Content Placeholder 2">
-            <a:extLst>
-              <a:ext uri="{FF2B5EF4-FFF2-40B4-BE49-F238E27FC236}">
-                <a16:creationId xmlns:a16="http://schemas.microsoft.com/office/drawing/2014/main" id="{2B973092-324D-4D2E-9271-6E63FFBD1C74}"/>
-              </a:ext>
-            </a:extLst>
-          </p:cNvPr>
-          <p:cNvSpPr>
-            <a:spLocks noGrp="1"/>
-          </p:cNvSpPr>
+      <p:pic>
+        <p:nvPicPr>
+          <p:cNvPr id="5" name="Content Placeholder 4">
+            <a:extLst>
+              <a:ext uri="{FF2B5EF4-FFF2-40B4-BE49-F238E27FC236}">
+                <a16:creationId xmlns:a16="http://schemas.microsoft.com/office/drawing/2014/main" id="{ACDD3D1E-8EFF-490D-9EC1-E882FD99884C}"/>
+              </a:ext>
+            </a:extLst>
+          </p:cNvPr>
+          <p:cNvPicPr>
+            <a:picLocks noGrp="1" noChangeAspect="1"/>
+          </p:cNvPicPr>
           <p:nvPr>
             <p:ph idx="1"/>
           </p:nvPr>
-        </p:nvSpPr>
+        </p:nvPicPr>
+        <p:blipFill>
+          <a:blip r:embed="rId2"/>
+          <a:stretch>
+            <a:fillRect/>
+          </a:stretch>
+        </p:blipFill>
         <p:spPr>
           <a:xfrm>
-            <a:off x="421200" y="1142312"/>
-            <a:ext cx="7886700" cy="2858876"/>
-          </a:xfrm>
-        </p:spPr>
-        <p:txBody>
-          <a:bodyPr/>
-          <a:lstStyle/>
-          <a:p>
-            <a:endParaRPr lang="en-US" dirty="0"/>
-          </a:p>
-        </p:txBody>
-      </p:sp>
+            <a:off x="421200" y="776921"/>
+            <a:ext cx="3746539" cy="3931011"/>
+          </a:xfrm>
+          <a:prstGeom prst="rect">
+            <a:avLst/>
+          </a:prstGeom>
+        </p:spPr>
+      </p:pic>
       <p:sp>
         <p:nvSpPr>
           <p:cNvPr id="4" name="Slide Number Placeholder 3">
@@ -14266,7 +14371,7 @@
           <p:cNvPr id="2" name="Title 1">
             <a:extLst>
               <a:ext uri="{FF2B5EF4-FFF2-40B4-BE49-F238E27FC236}">
-                <a16:creationId xmlns:a16="http://schemas.microsoft.com/office/drawing/2014/main" id="{B3BDD187-A6B6-4387-96DF-62555D6E1719}"/>
+                <a16:creationId xmlns:a16="http://schemas.microsoft.com/office/drawing/2014/main" id="{20A3E8DF-E3EC-43FE-B445-8FB21DF2B980}"/>
               </a:ext>
             </a:extLst>
           </p:cNvPr>
@@ -14277,37 +14382,20 @@
             <p:ph type="title"/>
           </p:nvPr>
         </p:nvSpPr>
-        <p:spPr/>
-        <p:txBody>
-          <a:bodyPr/>
+        <p:spPr>
+          <a:xfrm>
+            <a:off x="421200" y="283430"/>
+            <a:ext cx="7038231" cy="493492"/>
+          </a:xfrm>
+        </p:spPr>
+        <p:txBody>
+          <a:bodyPr anchor="t"/>
           <a:lstStyle/>
           <a:p>
-            <a:endParaRPr lang="en-US"/>
-          </a:p>
-        </p:txBody>
-      </p:sp>
-      <p:sp>
-        <p:nvSpPr>
-          <p:cNvPr id="3" name="Content Placeholder 2">
-            <a:extLst>
-              <a:ext uri="{FF2B5EF4-FFF2-40B4-BE49-F238E27FC236}">
-                <a16:creationId xmlns:a16="http://schemas.microsoft.com/office/drawing/2014/main" id="{D596A0A4-130C-4C24-8B12-1DF2395569BD}"/>
-              </a:ext>
-            </a:extLst>
-          </p:cNvPr>
-          <p:cNvSpPr>
-            <a:spLocks noGrp="1"/>
-          </p:cNvSpPr>
-          <p:nvPr>
-            <p:ph idx="1"/>
-          </p:nvPr>
-        </p:nvSpPr>
-        <p:spPr/>
-        <p:txBody>
-          <a:bodyPr/>
-          <a:lstStyle/>
-          <a:p>
-            <a:endParaRPr lang="en-US"/>
+            <a:r>
+              <a:rPr lang="en-US" dirty="0"/>
+              <a:t>Case I: Urban pickers in CABA</a:t>
+            </a:r>
           </a:p>
         </p:txBody>
       </p:sp>
@@ -14316,7 +14404,7 @@
           <p:cNvPr id="4" name="Slide Number Placeholder 3">
             <a:extLst>
               <a:ext uri="{FF2B5EF4-FFF2-40B4-BE49-F238E27FC236}">
-                <a16:creationId xmlns:a16="http://schemas.microsoft.com/office/drawing/2014/main" id="{6884FDC0-E406-4267-BB60-7F07C8387B27}"/>
+                <a16:creationId xmlns:a16="http://schemas.microsoft.com/office/drawing/2014/main" id="{D2D1F37F-F3E1-4AEE-ACEB-ED6126E2CF6A}"/>
               </a:ext>
             </a:extLst>
           </p:cNvPr>
@@ -14344,7 +14432,7 @@
     </p:spTree>
     <p:extLst>
       <p:ext uri="{BB962C8B-B14F-4D97-AF65-F5344CB8AC3E}">
-        <p14:creationId xmlns:p14="http://schemas.microsoft.com/office/powerpoint/2010/main" val="3561137991"/>
+        <p14:creationId xmlns:p14="http://schemas.microsoft.com/office/powerpoint/2010/main" val="552690269"/>
       </p:ext>
     </p:extLst>
   </p:cSld>
@@ -14376,7 +14464,7 @@
           <p:cNvPr id="2" name="Title 1">
             <a:extLst>
               <a:ext uri="{FF2B5EF4-FFF2-40B4-BE49-F238E27FC236}">
-                <a16:creationId xmlns:a16="http://schemas.microsoft.com/office/drawing/2014/main" id="{FB1B98A0-F7D9-4360-AF5A-A16B118F88EE}"/>
+                <a16:creationId xmlns:a16="http://schemas.microsoft.com/office/drawing/2014/main" id="{20A3E8DF-E3EC-43FE-B445-8FB21DF2B980}"/>
               </a:ext>
             </a:extLst>
           </p:cNvPr>
@@ -14387,37 +14475,20 @@
             <p:ph type="title"/>
           </p:nvPr>
         </p:nvSpPr>
-        <p:spPr/>
-        <p:txBody>
-          <a:bodyPr/>
+        <p:spPr>
+          <a:xfrm>
+            <a:off x="421200" y="283430"/>
+            <a:ext cx="7038231" cy="493492"/>
+          </a:xfrm>
+        </p:spPr>
+        <p:txBody>
+          <a:bodyPr anchor="t"/>
           <a:lstStyle/>
           <a:p>
-            <a:endParaRPr lang="en-US" dirty="0"/>
-          </a:p>
-        </p:txBody>
-      </p:sp>
-      <p:sp>
-        <p:nvSpPr>
-          <p:cNvPr id="3" name="Content Placeholder 2">
-            <a:extLst>
-              <a:ext uri="{FF2B5EF4-FFF2-40B4-BE49-F238E27FC236}">
-                <a16:creationId xmlns:a16="http://schemas.microsoft.com/office/drawing/2014/main" id="{D1A66141-E4AC-4699-B6E2-C19A61A60FE0}"/>
-              </a:ext>
-            </a:extLst>
-          </p:cNvPr>
-          <p:cNvSpPr>
-            <a:spLocks noGrp="1"/>
-          </p:cNvSpPr>
-          <p:nvPr>
-            <p:ph idx="1"/>
-          </p:nvPr>
-        </p:nvSpPr>
-        <p:spPr/>
-        <p:txBody>
-          <a:bodyPr/>
-          <a:lstStyle/>
-          <a:p>
-            <a:endParaRPr lang="en-US"/>
+            <a:r>
+              <a:rPr lang="en-US" dirty="0"/>
+              <a:t>Case II: Solid waste MGMT in GBG</a:t>
+            </a:r>
           </a:p>
         </p:txBody>
       </p:sp>
@@ -14426,7 +14497,7 @@
           <p:cNvPr id="4" name="Slide Number Placeholder 3">
             <a:extLst>
               <a:ext uri="{FF2B5EF4-FFF2-40B4-BE49-F238E27FC236}">
-                <a16:creationId xmlns:a16="http://schemas.microsoft.com/office/drawing/2014/main" id="{D50A94F3-C006-4801-97FF-769B9555EF62}"/>
+                <a16:creationId xmlns:a16="http://schemas.microsoft.com/office/drawing/2014/main" id="{D2D1F37F-F3E1-4AEE-ACEB-ED6126E2CF6A}"/>
               </a:ext>
             </a:extLst>
           </p:cNvPr>
@@ -14451,10 +14522,40 @@
           </a:p>
         </p:txBody>
       </p:sp>
+      <p:pic>
+        <p:nvPicPr>
+          <p:cNvPr id="7" name="Picture 6">
+            <a:extLst>
+              <a:ext uri="{FF2B5EF4-FFF2-40B4-BE49-F238E27FC236}">
+                <a16:creationId xmlns:a16="http://schemas.microsoft.com/office/drawing/2014/main" id="{338F6DD5-6828-4D44-899E-D5394C88094A}"/>
+              </a:ext>
+            </a:extLst>
+          </p:cNvPr>
+          <p:cNvPicPr>
+            <a:picLocks noChangeAspect="1"/>
+          </p:cNvPicPr>
+          <p:nvPr/>
+        </p:nvPicPr>
+        <p:blipFill>
+          <a:blip r:embed="rId2"/>
+          <a:stretch>
+            <a:fillRect/>
+          </a:stretch>
+        </p:blipFill>
+        <p:spPr>
+          <a:xfrm>
+            <a:off x="421200" y="953157"/>
+            <a:ext cx="3988892" cy="3237186"/>
+          </a:xfrm>
+          <a:prstGeom prst="rect">
+            <a:avLst/>
+          </a:prstGeom>
+        </p:spPr>
+      </p:pic>
     </p:spTree>
     <p:extLst>
       <p:ext uri="{BB962C8B-B14F-4D97-AF65-F5344CB8AC3E}">
-        <p14:creationId xmlns:p14="http://schemas.microsoft.com/office/powerpoint/2010/main" val="2394839115"/>
+        <p14:creationId xmlns:p14="http://schemas.microsoft.com/office/powerpoint/2010/main" val="61654877"/>
       </p:ext>
     </p:extLst>
   </p:cSld>
@@ -14486,15 +14587,15 @@
           <p:cNvPr id="2" name="Title 1">
             <a:extLst>
               <a:ext uri="{FF2B5EF4-FFF2-40B4-BE49-F238E27FC236}">
-                <a16:creationId xmlns:a16="http://schemas.microsoft.com/office/drawing/2014/main" id="{6756827A-72C6-7644-81CF-2914EC4E579C}"/>
-              </a:ext>
-            </a:extLst>
-          </p:cNvPr>
-          <p:cNvSpPr>
-            <a:spLocks noGrp="1"/>
-          </p:cNvSpPr>
-          <p:nvPr>
-            <p:ph type="ctrTitle"/>
+                <a16:creationId xmlns:a16="http://schemas.microsoft.com/office/drawing/2014/main" id="{FB1B98A0-F7D9-4360-AF5A-A16B118F88EE}"/>
+              </a:ext>
+            </a:extLst>
+          </p:cNvPr>
+          <p:cNvSpPr>
+            <a:spLocks noGrp="1"/>
+          </p:cNvSpPr>
+          <p:nvPr>
+            <p:ph type="title"/>
           </p:nvPr>
         </p:nvSpPr>
         <p:spPr/>
@@ -14502,28 +14603,24 @@
           <a:bodyPr/>
           <a:lstStyle/>
           <a:p>
-            <a:r>
-              <a:rPr lang="en-US" dirty="0"/>
-              <a:t>October 15th</a:t>
-            </a:r>
-            <a:endParaRPr lang="en-SE" dirty="0"/>
-          </a:p>
-        </p:txBody>
-      </p:sp>
-      <p:sp>
-        <p:nvSpPr>
-          <p:cNvPr id="3" name="Subtitle 2">
-            <a:extLst>
-              <a:ext uri="{FF2B5EF4-FFF2-40B4-BE49-F238E27FC236}">
-                <a16:creationId xmlns:a16="http://schemas.microsoft.com/office/drawing/2014/main" id="{10C662F5-4055-8646-ADED-6DDE72390DA5}"/>
-              </a:ext>
-            </a:extLst>
-          </p:cNvPr>
-          <p:cNvSpPr>
-            <a:spLocks noGrp="1"/>
-          </p:cNvSpPr>
-          <p:nvPr>
-            <p:ph type="subTitle" idx="1"/>
+            <a:endParaRPr lang="en-US" dirty="0"/>
+          </a:p>
+        </p:txBody>
+      </p:sp>
+      <p:sp>
+        <p:nvSpPr>
+          <p:cNvPr id="3" name="Content Placeholder 2">
+            <a:extLst>
+              <a:ext uri="{FF2B5EF4-FFF2-40B4-BE49-F238E27FC236}">
+                <a16:creationId xmlns:a16="http://schemas.microsoft.com/office/drawing/2014/main" id="{D1A66141-E4AC-4699-B6E2-C19A61A60FE0}"/>
+              </a:ext>
+            </a:extLst>
+          </p:cNvPr>
+          <p:cNvSpPr>
+            <a:spLocks noGrp="1"/>
+          </p:cNvSpPr>
+          <p:nvPr>
+            <p:ph idx="1"/>
           </p:nvPr>
         </p:nvSpPr>
         <p:spPr/>
@@ -14531,32 +14628,44 @@
           <a:bodyPr/>
           <a:lstStyle/>
           <a:p>
-            <a:r>
-              <a:rPr lang="en-US" dirty="0"/>
-              <a:t>Jonathan Cohen, PhD student</a:t>
-            </a:r>
-          </a:p>
-          <a:p>
-            <a:r>
-              <a:rPr lang="en-US" dirty="0"/>
-              <a:t>Jorge Gil, Supervisor</a:t>
-            </a:r>
-          </a:p>
-          <a:p>
-            <a:r>
-              <a:rPr lang="en-US" dirty="0"/>
-              <a:t>Lars Marcus, Supervisor</a:t>
-            </a:r>
-          </a:p>
-          <a:p>
-            <a:endParaRPr lang="en-SE" dirty="0"/>
+            <a:endParaRPr lang="en-US"/>
+          </a:p>
+        </p:txBody>
+      </p:sp>
+      <p:sp>
+        <p:nvSpPr>
+          <p:cNvPr id="4" name="Slide Number Placeholder 3">
+            <a:extLst>
+              <a:ext uri="{FF2B5EF4-FFF2-40B4-BE49-F238E27FC236}">
+                <a16:creationId xmlns:a16="http://schemas.microsoft.com/office/drawing/2014/main" id="{D50A94F3-C006-4801-97FF-769B9555EF62}"/>
+              </a:ext>
+            </a:extLst>
+          </p:cNvPr>
+          <p:cNvSpPr>
+            <a:spLocks noGrp="1"/>
+          </p:cNvSpPr>
+          <p:nvPr>
+            <p:ph type="sldNum" sz="quarter" idx="12"/>
+          </p:nvPr>
+        </p:nvSpPr>
+        <p:spPr/>
+        <p:txBody>
+          <a:bodyPr/>
+          <a:lstStyle/>
+          <a:p>
+            <a:fld id="{988E7F75-8447-2546-BC2C-A9D2B7675F08}" type="slidenum">
+              <a:rPr lang="en-GB" smtClean="0"/>
+              <a:pPr/>
+              <a:t>9</a:t>
+            </a:fld>
+            <a:endParaRPr lang="en-GB"/>
           </a:p>
         </p:txBody>
       </p:sp>
     </p:spTree>
     <p:extLst>
       <p:ext uri="{BB962C8B-B14F-4D97-AF65-F5344CB8AC3E}">
-        <p14:creationId xmlns:p14="http://schemas.microsoft.com/office/powerpoint/2010/main" val="1340043885"/>
+        <p14:creationId xmlns:p14="http://schemas.microsoft.com/office/powerpoint/2010/main" val="2394839115"/>
       </p:ext>
     </p:extLst>
   </p:cSld>

</xml_diff>